<commit_message>
made changes to the report
</commit_message>
<xml_diff>
--- a/Report/CaseStudyPresentation.pptx
+++ b/Report/CaseStudyPresentation.pptx
@@ -112,6 +112,11 @@
       </a:defRPr>
     </a:lvl9pPr>
   </p:defaultTextStyle>
+  <p:extLst>
+    <p:ext uri="{EFAFB233-063F-42B5-8137-9DF3F51BA10A}">
+      <p15:sldGuideLst xmlns:p15="http://schemas.microsoft.com/office/powerpoint/2012/main"/>
+    </p:ext>
+  </p:extLst>
 </p:presentation>
 </file>
 
@@ -5472,7 +5477,7 @@
           <a:graphicData uri="http://schemas.openxmlformats.org/presentationml/2006/ole">
             <mc:AlternateContent xmlns:mc="http://schemas.openxmlformats.org/markup-compatibility/2006">
               <mc:Choice xmlns:v="urn:schemas-microsoft-com:vml" Requires="v">
-                <p:oleObj spid="_x0000_s1030" name="think-cell Slide" r:id="rId22" imgW="7772400" imgH="10058400" progId="TCLayout.ActiveDocument.1">
+                <p:oleObj spid="_x0000_s1032" name="think-cell Slide" r:id="rId22" imgW="7772400" imgH="10058400" progId="TCLayout.ActiveDocument.1">
                   <p:embed/>
                 </p:oleObj>
               </mc:Choice>
@@ -6205,7 +6210,7 @@
           <a:graphicData uri="http://schemas.openxmlformats.org/presentationml/2006/ole">
             <mc:AlternateContent xmlns:mc="http://schemas.openxmlformats.org/markup-compatibility/2006">
               <mc:Choice xmlns:v="urn:schemas-microsoft-com:vml" Requires="v">
-                <p:oleObj spid="_x0000_s2054" name="think-cell Slide" r:id="rId5" imgW="7772400" imgH="10058400" progId="TCLayout.ActiveDocument.1">
+                <p:oleObj spid="_x0000_s2056" name="think-cell Slide" r:id="rId5" imgW="7772400" imgH="10058400" progId="TCLayout.ActiveDocument.1">
                   <p:embed/>
                 </p:oleObj>
               </mc:Choice>
@@ -6432,7 +6437,7 @@
           <a:graphicData uri="http://schemas.openxmlformats.org/presentationml/2006/ole">
             <mc:AlternateContent xmlns:mc="http://schemas.openxmlformats.org/markup-compatibility/2006">
               <mc:Choice xmlns:v="urn:schemas-microsoft-com:vml" Requires="v">
-                <p:oleObj spid="_x0000_s3078" name="think-cell Slide" r:id="rId4" imgW="7772400" imgH="10058400" progId="TCLayout.ActiveDocument.1">
+                <p:oleObj spid="_x0000_s3080" name="think-cell Slide" r:id="rId4" imgW="7772400" imgH="10058400" progId="TCLayout.ActiveDocument.1">
                   <p:embed/>
                 </p:oleObj>
               </mc:Choice>
@@ -6590,7 +6595,7 @@
           <a:graphicData uri="http://schemas.openxmlformats.org/presentationml/2006/ole">
             <mc:AlternateContent xmlns:mc="http://schemas.openxmlformats.org/markup-compatibility/2006">
               <mc:Choice xmlns:v="urn:schemas-microsoft-com:vml" Requires="v">
-                <p:oleObj spid="_x0000_s4102" name="think-cell Slide" r:id="rId4" imgW="7772400" imgH="10058400" progId="TCLayout.ActiveDocument.1">
+                <p:oleObj spid="_x0000_s4104" name="think-cell Slide" r:id="rId4" imgW="7772400" imgH="10058400" progId="TCLayout.ActiveDocument.1">
                   <p:embed/>
                 </p:oleObj>
               </mc:Choice>
@@ -6795,7 +6800,7 @@
           <a:graphicData uri="http://schemas.openxmlformats.org/presentationml/2006/ole">
             <mc:AlternateContent xmlns:mc="http://schemas.openxmlformats.org/markup-compatibility/2006">
               <mc:Choice xmlns:v="urn:schemas-microsoft-com:vml" Requires="v">
-                <p:oleObj spid="_x0000_s5127" name="think-cell Slide" r:id="rId4" imgW="7772400" imgH="10058400" progId="TCLayout.ActiveDocument.1">
+                <p:oleObj spid="_x0000_s5129" name="think-cell Slide" r:id="rId4" imgW="7772400" imgH="10058400" progId="TCLayout.ActiveDocument.1">
                   <p:embed/>
                 </p:oleObj>
               </mc:Choice>
@@ -8014,10 +8019,45 @@
       </p:grpSpPr>
       <p:sp>
         <p:nvSpPr>
-          <p:cNvPr id="2" name="Smiley Face 1">
+          <p:cNvPr id="86" name="TextBox 85">
             <a:extLst>
               <a:ext uri="{FF2B5EF4-FFF2-40B4-BE49-F238E27FC236}">
-                <a16:creationId xmlns:a16="http://schemas.microsoft.com/office/drawing/2014/main" id="{45C281FD-71CA-A145-AFEC-4F8C1D85EC26}"/>
+                <a16:creationId xmlns:a16="http://schemas.microsoft.com/office/drawing/2014/main" id="{3D567638-321A-8542-9648-1E033CE2F355}"/>
+              </a:ext>
+            </a:extLst>
+          </p:cNvPr>
+          <p:cNvSpPr txBox="1"/>
+          <p:nvPr/>
+        </p:nvSpPr>
+        <p:spPr>
+          <a:xfrm>
+            <a:off x="2562401" y="637033"/>
+            <a:ext cx="7048468" cy="369332"/>
+          </a:xfrm>
+          <a:prstGeom prst="rect">
+            <a:avLst/>
+          </a:prstGeom>
+          <a:noFill/>
+        </p:spPr>
+        <p:txBody>
+          <a:bodyPr wrap="none" rtlCol="0">
+            <a:spAutoFit/>
+          </a:bodyPr>
+          <a:lstStyle/>
+          <a:p>
+            <a:r>
+              <a:rPr lang="en-GB" u="sng" dirty="0"/>
+              <a:t>A Simplified Data Model, Showing connections between entities in the data</a:t>
+            </a:r>
+          </a:p>
+        </p:txBody>
+      </p:sp>
+      <p:sp>
+        <p:nvSpPr>
+          <p:cNvPr id="73" name="Smiley Face 72">
+            <a:extLst>
+              <a:ext uri="{FF2B5EF4-FFF2-40B4-BE49-F238E27FC236}">
+                <a16:creationId xmlns:a16="http://schemas.microsoft.com/office/drawing/2014/main" id="{1224883B-ADEA-0B4D-B25C-6FA49F0E6B6B}"/>
               </a:ext>
             </a:extLst>
           </p:cNvPr>
@@ -8026,7 +8066,7 @@
         </p:nvSpPr>
         <p:spPr>
           <a:xfrm>
-            <a:off x="5638800" y="4088228"/>
+            <a:off x="5583585" y="3560520"/>
             <a:ext cx="914400" cy="914400"/>
           </a:xfrm>
           <a:prstGeom prst="smileyFace">
@@ -8060,10 +8100,10 @@
       </p:sp>
       <p:sp>
         <p:nvSpPr>
-          <p:cNvPr id="3" name="TextBox 2">
+          <p:cNvPr id="75" name="TextBox 74">
             <a:extLst>
               <a:ext uri="{FF2B5EF4-FFF2-40B4-BE49-F238E27FC236}">
-                <a16:creationId xmlns:a16="http://schemas.microsoft.com/office/drawing/2014/main" id="{5F55C11D-5819-8845-84DB-5D1186199DCF}"/>
+                <a16:creationId xmlns:a16="http://schemas.microsoft.com/office/drawing/2014/main" id="{B884559D-D229-C04E-8AEF-1AF5C541DE94}"/>
               </a:ext>
             </a:extLst>
           </p:cNvPr>
@@ -8072,7 +8112,7 @@
         </p:nvSpPr>
         <p:spPr>
           <a:xfrm>
-            <a:off x="5528580" y="5118374"/>
+            <a:off x="5526823" y="4412976"/>
             <a:ext cx="1009187" cy="369332"/>
           </a:xfrm>
           <a:prstGeom prst="rect">
@@ -8095,10 +8135,10 @@
       </p:sp>
       <p:sp>
         <p:nvSpPr>
-          <p:cNvPr id="4" name="Triangle 3">
+          <p:cNvPr id="76" name="Triangle 75">
             <a:extLst>
               <a:ext uri="{FF2B5EF4-FFF2-40B4-BE49-F238E27FC236}">
-                <a16:creationId xmlns:a16="http://schemas.microsoft.com/office/drawing/2014/main" id="{A2EFAD73-3BF2-AF48-86CB-A34306DEE91E}"/>
+                <a16:creationId xmlns:a16="http://schemas.microsoft.com/office/drawing/2014/main" id="{2356365C-5ADC-3949-803A-E9E8886041EA}"/>
               </a:ext>
             </a:extLst>
           </p:cNvPr>
@@ -8141,10 +8181,10 @@
       </p:sp>
       <p:sp>
         <p:nvSpPr>
-          <p:cNvPr id="5" name="TextBox 4">
+          <p:cNvPr id="77" name="TextBox 76">
             <a:extLst>
               <a:ext uri="{FF2B5EF4-FFF2-40B4-BE49-F238E27FC236}">
-                <a16:creationId xmlns:a16="http://schemas.microsoft.com/office/drawing/2014/main" id="{64AF9621-18D7-9842-B28E-0CF01562D846}"/>
+                <a16:creationId xmlns:a16="http://schemas.microsoft.com/office/drawing/2014/main" id="{AC9C348C-AB65-7641-8044-657FD1463013}"/>
               </a:ext>
             </a:extLst>
           </p:cNvPr>
@@ -8176,24 +8216,24 @@
       </p:sp>
       <p:cxnSp>
         <p:nvCxnSpPr>
-          <p:cNvPr id="7" name="Straight Arrow Connector 6">
+          <p:cNvPr id="80" name="Straight Arrow Connector 79">
             <a:extLst>
               <a:ext uri="{FF2B5EF4-FFF2-40B4-BE49-F238E27FC236}">
-                <a16:creationId xmlns:a16="http://schemas.microsoft.com/office/drawing/2014/main" id="{71AFE866-FD1C-2A4C-A613-7C6FCAEA582A}"/>
+                <a16:creationId xmlns:a16="http://schemas.microsoft.com/office/drawing/2014/main" id="{0C804BB2-2FBA-D240-8A92-3CF409DC9FF3}"/>
               </a:ext>
             </a:extLst>
           </p:cNvPr>
           <p:cNvCxnSpPr>
             <a:cxnSpLocks/>
-            <a:stCxn id="2" idx="2"/>
-            <a:endCxn id="4" idx="4"/>
+            <a:stCxn id="73" idx="2"/>
+            <a:endCxn id="76" idx="4"/>
           </p:cNvCxnSpPr>
           <p:nvPr/>
         </p:nvCxnSpPr>
         <p:spPr>
-          <a:xfrm flipH="1" flipV="1">
-            <a:off x="4210947" y="4053503"/>
-            <a:ext cx="1427853" cy="491925"/>
+          <a:xfrm flipH="1">
+            <a:off x="4210947" y="4017720"/>
+            <a:ext cx="1372638" cy="35783"/>
           </a:xfrm>
           <a:prstGeom prst="straightConnector1">
             <a:avLst/>
@@ -8219,10 +8259,10 @@
       </p:cxnSp>
       <p:sp>
         <p:nvSpPr>
-          <p:cNvPr id="8" name="TextBox 7">
+          <p:cNvPr id="83" name="TextBox 82">
             <a:extLst>
               <a:ext uri="{FF2B5EF4-FFF2-40B4-BE49-F238E27FC236}">
-                <a16:creationId xmlns:a16="http://schemas.microsoft.com/office/drawing/2014/main" id="{717DAFCE-D871-6D40-9A09-832A2E8BCA49}"/>
+                <a16:creationId xmlns:a16="http://schemas.microsoft.com/office/drawing/2014/main" id="{3ADAE409-BD57-F54E-BA81-D252ECE939C3}"/>
               </a:ext>
             </a:extLst>
           </p:cNvPr>
@@ -8231,7 +8271,7 @@
         </p:nvSpPr>
         <p:spPr>
           <a:xfrm>
-            <a:off x="4519393" y="3833054"/>
+            <a:off x="4342719" y="3733421"/>
             <a:ext cx="718466" cy="369332"/>
           </a:xfrm>
           <a:prstGeom prst="rect">
@@ -8254,10 +8294,10 @@
       </p:sp>
       <p:sp>
         <p:nvSpPr>
-          <p:cNvPr id="10" name="Oval 9">
+          <p:cNvPr id="84" name="Oval 83">
             <a:extLst>
               <a:ext uri="{FF2B5EF4-FFF2-40B4-BE49-F238E27FC236}">
-                <a16:creationId xmlns:a16="http://schemas.microsoft.com/office/drawing/2014/main" id="{D14B964C-A342-2948-9C79-2497F90405C6}"/>
+                <a16:creationId xmlns:a16="http://schemas.microsoft.com/office/drawing/2014/main" id="{B17BE946-6BE7-C748-90F1-46D099454F00}"/>
               </a:ext>
             </a:extLst>
           </p:cNvPr>
@@ -8300,24 +8340,24 @@
       </p:sp>
       <p:cxnSp>
         <p:nvCxnSpPr>
-          <p:cNvPr id="11" name="Straight Arrow Connector 10">
+          <p:cNvPr id="85" name="Straight Arrow Connector 84">
             <a:extLst>
               <a:ext uri="{FF2B5EF4-FFF2-40B4-BE49-F238E27FC236}">
-                <a16:creationId xmlns:a16="http://schemas.microsoft.com/office/drawing/2014/main" id="{97C7DEB8-F82B-484A-A354-4FCBBE501861}"/>
+                <a16:creationId xmlns:a16="http://schemas.microsoft.com/office/drawing/2014/main" id="{C820BC9E-F900-B143-AB58-5990A3F1F65B}"/>
               </a:ext>
             </a:extLst>
           </p:cNvPr>
           <p:cNvCxnSpPr>
             <a:cxnSpLocks/>
-            <a:stCxn id="2" idx="6"/>
-            <a:endCxn id="10" idx="2"/>
+            <a:stCxn id="73" idx="6"/>
+            <a:endCxn id="84" idx="2"/>
           </p:cNvCxnSpPr>
           <p:nvPr/>
         </p:nvCxnSpPr>
         <p:spPr>
-          <a:xfrm flipV="1">
-            <a:off x="6553200" y="4311027"/>
-            <a:ext cx="902834" cy="234401"/>
+          <a:xfrm>
+            <a:off x="6497985" y="4017720"/>
+            <a:ext cx="958049" cy="293307"/>
           </a:xfrm>
           <a:prstGeom prst="straightConnector1">
             <a:avLst/>
@@ -8343,10 +8383,10 @@
       </p:cxnSp>
       <p:sp>
         <p:nvSpPr>
-          <p:cNvPr id="16" name="TextBox 15">
+          <p:cNvPr id="87" name="TextBox 86">
             <a:extLst>
               <a:ext uri="{FF2B5EF4-FFF2-40B4-BE49-F238E27FC236}">
-                <a16:creationId xmlns:a16="http://schemas.microsoft.com/office/drawing/2014/main" id="{56A8C344-E163-664A-B96E-56E7508B80C7}"/>
+                <a16:creationId xmlns:a16="http://schemas.microsoft.com/office/drawing/2014/main" id="{B8BA0736-CF50-D84C-8F8B-570E1B04EB1F}"/>
               </a:ext>
             </a:extLst>
           </p:cNvPr>
@@ -8355,7 +8395,7 @@
         </p:nvSpPr>
         <p:spPr>
           <a:xfrm>
-            <a:off x="6630816" y="4425523"/>
+            <a:off x="7200570" y="4772255"/>
             <a:ext cx="946093" cy="369332"/>
           </a:xfrm>
           <a:prstGeom prst="rect">
@@ -8378,10 +8418,10 @@
       </p:sp>
       <p:sp>
         <p:nvSpPr>
-          <p:cNvPr id="17" name="TextBox 16">
+          <p:cNvPr id="88" name="TextBox 87">
             <a:extLst>
               <a:ext uri="{FF2B5EF4-FFF2-40B4-BE49-F238E27FC236}">
-                <a16:creationId xmlns:a16="http://schemas.microsoft.com/office/drawing/2014/main" id="{AAF0BC68-1430-F047-AB8C-02B6BDA013CB}"/>
+                <a16:creationId xmlns:a16="http://schemas.microsoft.com/office/drawing/2014/main" id="{B0AF75E5-31D0-464B-9284-21186A6EBFDC}"/>
               </a:ext>
             </a:extLst>
           </p:cNvPr>
@@ -8413,10 +8453,10 @@
       </p:sp>
       <p:sp>
         <p:nvSpPr>
-          <p:cNvPr id="20" name="Lightning Bolt 19">
+          <p:cNvPr id="89" name="Lightning Bolt 88">
             <a:extLst>
               <a:ext uri="{FF2B5EF4-FFF2-40B4-BE49-F238E27FC236}">
-                <a16:creationId xmlns:a16="http://schemas.microsoft.com/office/drawing/2014/main" id="{67E2368C-41BC-CB4E-AFB5-18941BA40020}"/>
+                <a16:creationId xmlns:a16="http://schemas.microsoft.com/office/drawing/2014/main" id="{09CFC932-AA6E-D64F-B185-052635761837}"/>
               </a:ext>
             </a:extLst>
           </p:cNvPr>
@@ -8459,10 +8499,10 @@
       </p:sp>
       <p:sp>
         <p:nvSpPr>
-          <p:cNvPr id="21" name="TextBox 20">
+          <p:cNvPr id="90" name="TextBox 89">
             <a:extLst>
               <a:ext uri="{FF2B5EF4-FFF2-40B4-BE49-F238E27FC236}">
-                <a16:creationId xmlns:a16="http://schemas.microsoft.com/office/drawing/2014/main" id="{110DD371-E865-9643-8416-BB2F727207B1}"/>
+                <a16:creationId xmlns:a16="http://schemas.microsoft.com/office/drawing/2014/main" id="{D21C3F60-934E-CB4D-BE7F-D9845142684E}"/>
               </a:ext>
             </a:extLst>
           </p:cNvPr>
@@ -8494,23 +8534,22 @@
       </p:sp>
       <p:cxnSp>
         <p:nvCxnSpPr>
-          <p:cNvPr id="22" name="Straight Arrow Connector 21">
+          <p:cNvPr id="91" name="Straight Arrow Connector 90">
             <a:extLst>
               <a:ext uri="{FF2B5EF4-FFF2-40B4-BE49-F238E27FC236}">
-                <a16:creationId xmlns:a16="http://schemas.microsoft.com/office/drawing/2014/main" id="{4D9F60B6-DFBE-B243-A2D2-4B240CDF5B01}"/>
+                <a16:creationId xmlns:a16="http://schemas.microsoft.com/office/drawing/2014/main" id="{1B94BCB7-D9CD-0C43-89A7-68033D3ACF2B}"/>
               </a:ext>
             </a:extLst>
           </p:cNvPr>
           <p:cNvCxnSpPr>
             <a:cxnSpLocks/>
-            <a:endCxn id="2" idx="0"/>
           </p:cNvCxnSpPr>
           <p:nvPr/>
         </p:nvCxnSpPr>
         <p:spPr>
           <a:xfrm>
             <a:off x="6077270" y="2156867"/>
-            <a:ext cx="18730" cy="1931361"/>
+            <a:ext cx="0" cy="1434044"/>
           </a:xfrm>
           <a:prstGeom prst="straightConnector1">
             <a:avLst/>
@@ -8536,10 +8575,10 @@
       </p:cxnSp>
       <p:sp>
         <p:nvSpPr>
-          <p:cNvPr id="26" name="TextBox 25">
+          <p:cNvPr id="92" name="TextBox 91">
             <a:extLst>
               <a:ext uri="{FF2B5EF4-FFF2-40B4-BE49-F238E27FC236}">
-                <a16:creationId xmlns:a16="http://schemas.microsoft.com/office/drawing/2014/main" id="{284D069B-C149-4247-A757-2E97CA8C902F}"/>
+                <a16:creationId xmlns:a16="http://schemas.microsoft.com/office/drawing/2014/main" id="{84CC4C0C-575C-0A40-96D4-854D9DA28FCB}"/>
               </a:ext>
             </a:extLst>
           </p:cNvPr>
@@ -8548,7 +8587,7 @@
         </p:nvSpPr>
         <p:spPr>
           <a:xfrm>
-            <a:off x="6261590" y="3232476"/>
+            <a:off x="5154343" y="2412740"/>
             <a:ext cx="1239442" cy="369332"/>
           </a:xfrm>
           <a:prstGeom prst="rect">
@@ -8571,16 +8610,16 @@
       </p:sp>
       <p:cxnSp>
         <p:nvCxnSpPr>
-          <p:cNvPr id="27" name="Straight Arrow Connector 26">
+          <p:cNvPr id="93" name="Straight Arrow Connector 92">
             <a:extLst>
               <a:ext uri="{FF2B5EF4-FFF2-40B4-BE49-F238E27FC236}">
-                <a16:creationId xmlns:a16="http://schemas.microsoft.com/office/drawing/2014/main" id="{39C261F2-443B-EB4D-BFA8-37956D8F62ED}"/>
+                <a16:creationId xmlns:a16="http://schemas.microsoft.com/office/drawing/2014/main" id="{35A27294-B6FB-A242-93CD-F7E923807C49}"/>
               </a:ext>
             </a:extLst>
           </p:cNvPr>
           <p:cNvCxnSpPr>
             <a:cxnSpLocks/>
-            <a:stCxn id="20" idx="6"/>
+            <a:stCxn id="89" idx="6"/>
           </p:cNvCxnSpPr>
           <p:nvPr/>
         </p:nvCxnSpPr>
@@ -8613,10 +8652,10 @@
       </p:cxnSp>
       <p:sp>
         <p:nvSpPr>
-          <p:cNvPr id="30" name="Predefined Process 29">
+          <p:cNvPr id="94" name="Predefined Process 93">
             <a:extLst>
               <a:ext uri="{FF2B5EF4-FFF2-40B4-BE49-F238E27FC236}">
-                <a16:creationId xmlns:a16="http://schemas.microsoft.com/office/drawing/2014/main" id="{F37DDA38-13EA-6841-9598-B5B1FAB92276}"/>
+                <a16:creationId xmlns:a16="http://schemas.microsoft.com/office/drawing/2014/main" id="{BC2B790A-BB16-B24F-B483-2E5577942AEB}"/>
               </a:ext>
             </a:extLst>
           </p:cNvPr>
@@ -8659,10 +8698,10 @@
       </p:sp>
       <p:sp>
         <p:nvSpPr>
-          <p:cNvPr id="33" name="TextBox 32">
+          <p:cNvPr id="95" name="TextBox 94">
             <a:extLst>
               <a:ext uri="{FF2B5EF4-FFF2-40B4-BE49-F238E27FC236}">
-                <a16:creationId xmlns:a16="http://schemas.microsoft.com/office/drawing/2014/main" id="{9CA8B1C9-73BA-A74F-A475-D420AB20539B}"/>
+                <a16:creationId xmlns:a16="http://schemas.microsoft.com/office/drawing/2014/main" id="{A7EAD5C9-D5B0-9C49-B416-F56CA68862D0}"/>
               </a:ext>
             </a:extLst>
           </p:cNvPr>
@@ -8671,7 +8710,7 @@
         </p:nvSpPr>
         <p:spPr>
           <a:xfrm>
-            <a:off x="7322338" y="2068704"/>
+            <a:off x="7218446" y="1026631"/>
             <a:ext cx="966740" cy="369332"/>
           </a:xfrm>
           <a:prstGeom prst="rect">
@@ -8694,16 +8733,16 @@
       </p:sp>
       <p:cxnSp>
         <p:nvCxnSpPr>
-          <p:cNvPr id="35" name="Straight Arrow Connector 34">
+          <p:cNvPr id="96" name="Straight Arrow Connector 95">
             <a:extLst>
               <a:ext uri="{FF2B5EF4-FFF2-40B4-BE49-F238E27FC236}">
-                <a16:creationId xmlns:a16="http://schemas.microsoft.com/office/drawing/2014/main" id="{EFBC19E7-7B62-CC4F-B9D3-854750764670}"/>
+                <a16:creationId xmlns:a16="http://schemas.microsoft.com/office/drawing/2014/main" id="{2ED4D33F-ABED-5440-9BEF-D503E954C882}"/>
               </a:ext>
             </a:extLst>
           </p:cNvPr>
           <p:cNvCxnSpPr>
             <a:cxnSpLocks/>
-            <a:stCxn id="30" idx="3"/>
+            <a:stCxn id="94" idx="3"/>
           </p:cNvCxnSpPr>
           <p:nvPr/>
         </p:nvCxnSpPr>
@@ -8736,10 +8775,10 @@
       </p:cxnSp>
       <p:sp>
         <p:nvSpPr>
-          <p:cNvPr id="36" name="Horizontal Scroll 35">
+          <p:cNvPr id="97" name="Horizontal Scroll 96">
             <a:extLst>
               <a:ext uri="{FF2B5EF4-FFF2-40B4-BE49-F238E27FC236}">
-                <a16:creationId xmlns:a16="http://schemas.microsoft.com/office/drawing/2014/main" id="{9EF5A932-8385-454B-A94A-E2BF6D3F75E2}"/>
+                <a16:creationId xmlns:a16="http://schemas.microsoft.com/office/drawing/2014/main" id="{74D468FA-ACA0-3F48-B9D5-2C7074CFDF21}"/>
               </a:ext>
             </a:extLst>
           </p:cNvPr>
@@ -8782,10 +8821,10 @@
       </p:sp>
       <p:sp>
         <p:nvSpPr>
-          <p:cNvPr id="37" name="TextBox 36">
+          <p:cNvPr id="98" name="TextBox 97">
             <a:extLst>
               <a:ext uri="{FF2B5EF4-FFF2-40B4-BE49-F238E27FC236}">
-                <a16:creationId xmlns:a16="http://schemas.microsoft.com/office/drawing/2014/main" id="{2DDF6AD6-93DC-FF4A-8876-17A28D40287B}"/>
+                <a16:creationId xmlns:a16="http://schemas.microsoft.com/office/drawing/2014/main" id="{24D829B8-EEAE-624A-8CD8-5D1F3ECF5FF6}"/>
               </a:ext>
             </a:extLst>
           </p:cNvPr>
@@ -8817,10 +8856,10 @@
       </p:sp>
       <p:sp>
         <p:nvSpPr>
-          <p:cNvPr id="38" name="Rectangle 37">
+          <p:cNvPr id="99" name="Rectangle 98">
             <a:extLst>
               <a:ext uri="{FF2B5EF4-FFF2-40B4-BE49-F238E27FC236}">
-                <a16:creationId xmlns:a16="http://schemas.microsoft.com/office/drawing/2014/main" id="{FE1C59B9-FA5F-F44A-9BD8-99A83590C260}"/>
+                <a16:creationId xmlns:a16="http://schemas.microsoft.com/office/drawing/2014/main" id="{A052F6F1-6D9C-C344-96A8-C9E9BA5F8603}"/>
               </a:ext>
             </a:extLst>
           </p:cNvPr>
@@ -8851,17 +8890,17 @@
       </p:sp>
       <p:cxnSp>
         <p:nvCxnSpPr>
-          <p:cNvPr id="39" name="Straight Arrow Connector 38">
+          <p:cNvPr id="100" name="Straight Arrow Connector 99">
             <a:extLst>
               <a:ext uri="{FF2B5EF4-FFF2-40B4-BE49-F238E27FC236}">
-                <a16:creationId xmlns:a16="http://schemas.microsoft.com/office/drawing/2014/main" id="{25A160D3-4641-8442-B6ED-30E309C2C825}"/>
+                <a16:creationId xmlns:a16="http://schemas.microsoft.com/office/drawing/2014/main" id="{6487D313-13FC-FA43-ADA3-90E16D276011}"/>
               </a:ext>
             </a:extLst>
           </p:cNvPr>
           <p:cNvCxnSpPr>
             <a:cxnSpLocks/>
-            <a:stCxn id="10" idx="7"/>
-            <a:endCxn id="45" idx="1"/>
+            <a:stCxn id="84" idx="7"/>
+            <a:endCxn id="104" idx="1"/>
           </p:cNvCxnSpPr>
           <p:nvPr/>
         </p:nvCxnSpPr>
@@ -8894,17 +8933,17 @@
       </p:cxnSp>
       <p:cxnSp>
         <p:nvCxnSpPr>
-          <p:cNvPr id="40" name="Straight Arrow Connector 39">
+          <p:cNvPr id="101" name="Straight Arrow Connector 100">
             <a:extLst>
               <a:ext uri="{FF2B5EF4-FFF2-40B4-BE49-F238E27FC236}">
-                <a16:creationId xmlns:a16="http://schemas.microsoft.com/office/drawing/2014/main" id="{4A64B7F4-9C75-AF44-878B-93B2782C6A5D}"/>
+                <a16:creationId xmlns:a16="http://schemas.microsoft.com/office/drawing/2014/main" id="{14D4713A-DE9D-E24D-AC7E-BEC646F966ED}"/>
               </a:ext>
             </a:extLst>
           </p:cNvPr>
           <p:cNvCxnSpPr>
             <a:cxnSpLocks/>
-            <a:stCxn id="10" idx="6"/>
-            <a:endCxn id="46" idx="1"/>
+            <a:stCxn id="84" idx="6"/>
+            <a:endCxn id="105" idx="1"/>
           </p:cNvCxnSpPr>
           <p:nvPr/>
         </p:nvCxnSpPr>
@@ -8937,10 +8976,10 @@
       </p:cxnSp>
       <p:sp>
         <p:nvSpPr>
-          <p:cNvPr id="42" name="Rectangle 41">
+          <p:cNvPr id="102" name="Rectangle 101">
             <a:extLst>
               <a:ext uri="{FF2B5EF4-FFF2-40B4-BE49-F238E27FC236}">
-                <a16:creationId xmlns:a16="http://schemas.microsoft.com/office/drawing/2014/main" id="{660DEC40-937B-8244-A8AC-5304C876F9BA}"/>
+                <a16:creationId xmlns:a16="http://schemas.microsoft.com/office/drawing/2014/main" id="{A1B9ABB2-1B3B-3A40-8D72-3A61BEB586A4}"/>
               </a:ext>
             </a:extLst>
           </p:cNvPr>
@@ -8983,10 +9022,10 @@
       </p:sp>
       <p:sp>
         <p:nvSpPr>
-          <p:cNvPr id="44" name="Rectangle 43">
+          <p:cNvPr id="103" name="Rectangle 102">
             <a:extLst>
               <a:ext uri="{FF2B5EF4-FFF2-40B4-BE49-F238E27FC236}">
-                <a16:creationId xmlns:a16="http://schemas.microsoft.com/office/drawing/2014/main" id="{B8AC18CE-B0E3-224F-8CF7-1FACBDA8A24B}"/>
+                <a16:creationId xmlns:a16="http://schemas.microsoft.com/office/drawing/2014/main" id="{D40BE1A1-6BE6-DA4F-BB59-83D0BDBBBFD7}"/>
               </a:ext>
             </a:extLst>
           </p:cNvPr>
@@ -9029,10 +9068,10 @@
       </p:sp>
       <p:sp>
         <p:nvSpPr>
-          <p:cNvPr id="45" name="TextBox 44">
+          <p:cNvPr id="104" name="TextBox 103">
             <a:extLst>
               <a:ext uri="{FF2B5EF4-FFF2-40B4-BE49-F238E27FC236}">
-                <a16:creationId xmlns:a16="http://schemas.microsoft.com/office/drawing/2014/main" id="{886E5A89-CCD0-D146-8EF5-5C4BC6D43ACB}"/>
+                <a16:creationId xmlns:a16="http://schemas.microsoft.com/office/drawing/2014/main" id="{5BF99453-22DA-AF4E-A2F1-B7DA3F04EC8C}"/>
               </a:ext>
             </a:extLst>
           </p:cNvPr>
@@ -9064,10 +9103,10 @@
       </p:sp>
       <p:sp>
         <p:nvSpPr>
-          <p:cNvPr id="46" name="TextBox 45">
+          <p:cNvPr id="105" name="TextBox 104">
             <a:extLst>
               <a:ext uri="{FF2B5EF4-FFF2-40B4-BE49-F238E27FC236}">
-                <a16:creationId xmlns:a16="http://schemas.microsoft.com/office/drawing/2014/main" id="{EE705772-872A-6D44-8900-BB03782AA4E2}"/>
+                <a16:creationId xmlns:a16="http://schemas.microsoft.com/office/drawing/2014/main" id="{63D3114A-11C4-0E41-8B7B-E53F502642A1}"/>
               </a:ext>
             </a:extLst>
           </p:cNvPr>
@@ -9099,10 +9138,10 @@
       </p:sp>
       <p:sp>
         <p:nvSpPr>
-          <p:cNvPr id="47" name="Rectangle 46">
+          <p:cNvPr id="106" name="Rectangle 105">
             <a:extLst>
               <a:ext uri="{FF2B5EF4-FFF2-40B4-BE49-F238E27FC236}">
-                <a16:creationId xmlns:a16="http://schemas.microsoft.com/office/drawing/2014/main" id="{E7F08263-3273-BA49-B288-BD33847F1894}"/>
+                <a16:creationId xmlns:a16="http://schemas.microsoft.com/office/drawing/2014/main" id="{5BEFF2E8-F288-5C44-B3BE-30747310AEA2}"/>
               </a:ext>
             </a:extLst>
           </p:cNvPr>
@@ -9145,10 +9184,10 @@
       </p:sp>
       <p:sp>
         <p:nvSpPr>
-          <p:cNvPr id="48" name="TextBox 47">
+          <p:cNvPr id="107" name="TextBox 106">
             <a:extLst>
               <a:ext uri="{FF2B5EF4-FFF2-40B4-BE49-F238E27FC236}">
-                <a16:creationId xmlns:a16="http://schemas.microsoft.com/office/drawing/2014/main" id="{C30F7EA3-5E06-AF49-8020-AFFC57A72168}"/>
+                <a16:creationId xmlns:a16="http://schemas.microsoft.com/office/drawing/2014/main" id="{E9C0ED4D-665F-6C4B-ABA5-74EBCBC49E68}"/>
               </a:ext>
             </a:extLst>
           </p:cNvPr>
@@ -9180,17 +9219,17 @@
       </p:sp>
       <p:cxnSp>
         <p:nvCxnSpPr>
-          <p:cNvPr id="49" name="Straight Arrow Connector 48">
+          <p:cNvPr id="108" name="Straight Arrow Connector 107">
             <a:extLst>
               <a:ext uri="{FF2B5EF4-FFF2-40B4-BE49-F238E27FC236}">
-                <a16:creationId xmlns:a16="http://schemas.microsoft.com/office/drawing/2014/main" id="{50E0A042-5FB0-A340-AFB2-96FACE12122F}"/>
+                <a16:creationId xmlns:a16="http://schemas.microsoft.com/office/drawing/2014/main" id="{523CB3C1-55EC-FA43-95AD-63524A4A9E6E}"/>
               </a:ext>
             </a:extLst>
           </p:cNvPr>
           <p:cNvCxnSpPr>
             <a:cxnSpLocks/>
-            <a:stCxn id="10" idx="5"/>
-            <a:endCxn id="47" idx="1"/>
+            <a:stCxn id="84" idx="5"/>
+            <a:endCxn id="106" idx="1"/>
           </p:cNvCxnSpPr>
           <p:nvPr/>
         </p:nvCxnSpPr>
@@ -9223,10 +9262,10 @@
       </p:cxnSp>
       <p:sp>
         <p:nvSpPr>
-          <p:cNvPr id="69" name="TextBox 68">
+          <p:cNvPr id="109" name="TextBox 108">
             <a:extLst>
               <a:ext uri="{FF2B5EF4-FFF2-40B4-BE49-F238E27FC236}">
-                <a16:creationId xmlns:a16="http://schemas.microsoft.com/office/drawing/2014/main" id="{041CEB8B-D531-7841-98F1-FEC16D54AF3E}"/>
+                <a16:creationId xmlns:a16="http://schemas.microsoft.com/office/drawing/2014/main" id="{B0CF5B6D-4F52-C045-AA15-62AE56CC789C}"/>
               </a:ext>
             </a:extLst>
           </p:cNvPr>
@@ -9258,10 +9297,10 @@
       </p:sp>
       <p:sp>
         <p:nvSpPr>
-          <p:cNvPr id="70" name="TextBox 69">
+          <p:cNvPr id="110" name="TextBox 109">
             <a:extLst>
               <a:ext uri="{FF2B5EF4-FFF2-40B4-BE49-F238E27FC236}">
-                <a16:creationId xmlns:a16="http://schemas.microsoft.com/office/drawing/2014/main" id="{0F7C3A19-5DCF-8E4E-B503-5762D4967C46}"/>
+                <a16:creationId xmlns:a16="http://schemas.microsoft.com/office/drawing/2014/main" id="{761C4291-8262-3547-A21A-2E78567DE253}"/>
               </a:ext>
             </a:extLst>
           </p:cNvPr>
@@ -9293,10 +9332,10 @@
       </p:sp>
       <p:sp>
         <p:nvSpPr>
-          <p:cNvPr id="71" name="TextBox 70">
+          <p:cNvPr id="111" name="TextBox 110">
             <a:extLst>
               <a:ext uri="{FF2B5EF4-FFF2-40B4-BE49-F238E27FC236}">
-                <a16:creationId xmlns:a16="http://schemas.microsoft.com/office/drawing/2014/main" id="{6342EF0C-9D4F-F64C-BACD-C80EC64D043E}"/>
+                <a16:creationId xmlns:a16="http://schemas.microsoft.com/office/drawing/2014/main" id="{EE706F3B-C511-C74A-AC84-C15A9FE283E2}"/>
               </a:ext>
             </a:extLst>
           </p:cNvPr>
@@ -9328,10 +9367,10 @@
       </p:sp>
       <p:cxnSp>
         <p:nvCxnSpPr>
-          <p:cNvPr id="72" name="Straight Arrow Connector 71">
+          <p:cNvPr id="112" name="Straight Arrow Connector 111">
             <a:extLst>
               <a:ext uri="{FF2B5EF4-FFF2-40B4-BE49-F238E27FC236}">
-                <a16:creationId xmlns:a16="http://schemas.microsoft.com/office/drawing/2014/main" id="{0C5B7402-F381-0744-BCFF-EAAC6F1DD141}"/>
+                <a16:creationId xmlns:a16="http://schemas.microsoft.com/office/drawing/2014/main" id="{25BCFE92-3512-AF43-8F59-D7DCBB1EE02B}"/>
               </a:ext>
             </a:extLst>
           </p:cNvPr>
@@ -9369,16 +9408,16 @@
       </p:cxnSp>
       <p:cxnSp>
         <p:nvCxnSpPr>
-          <p:cNvPr id="74" name="Straight Arrow Connector 73">
+          <p:cNvPr id="113" name="Straight Arrow Connector 112">
             <a:extLst>
               <a:ext uri="{FF2B5EF4-FFF2-40B4-BE49-F238E27FC236}">
-                <a16:creationId xmlns:a16="http://schemas.microsoft.com/office/drawing/2014/main" id="{FDE93C46-D104-BC44-BE0E-346CFC6051AC}"/>
+                <a16:creationId xmlns:a16="http://schemas.microsoft.com/office/drawing/2014/main" id="{0F1F68BE-CAA6-2A40-8846-F1D0D1139FD3}"/>
               </a:ext>
             </a:extLst>
           </p:cNvPr>
           <p:cNvCxnSpPr>
             <a:cxnSpLocks/>
-            <a:stCxn id="4" idx="1"/>
+            <a:stCxn id="76" idx="1"/>
           </p:cNvCxnSpPr>
           <p:nvPr/>
         </p:nvCxnSpPr>
@@ -9411,10 +9450,10 @@
       </p:cxnSp>
       <p:sp>
         <p:nvSpPr>
-          <p:cNvPr id="78" name="Rectangle 77">
+          <p:cNvPr id="114" name="Rectangle 113">
             <a:extLst>
               <a:ext uri="{FF2B5EF4-FFF2-40B4-BE49-F238E27FC236}">
-                <a16:creationId xmlns:a16="http://schemas.microsoft.com/office/drawing/2014/main" id="{642CB2BC-7E70-A34D-A941-1D0F72461339}"/>
+                <a16:creationId xmlns:a16="http://schemas.microsoft.com/office/drawing/2014/main" id="{925AFC3C-3CC5-D04F-910A-015629157A08}"/>
               </a:ext>
             </a:extLst>
           </p:cNvPr>
@@ -9457,10 +9496,10 @@
       </p:sp>
       <p:sp>
         <p:nvSpPr>
-          <p:cNvPr id="79" name="Rectangle 78">
+          <p:cNvPr id="115" name="Rectangle 114">
             <a:extLst>
               <a:ext uri="{FF2B5EF4-FFF2-40B4-BE49-F238E27FC236}">
-                <a16:creationId xmlns:a16="http://schemas.microsoft.com/office/drawing/2014/main" id="{B784674E-347A-9E46-BB63-DC8EF22DE1A8}"/>
+                <a16:creationId xmlns:a16="http://schemas.microsoft.com/office/drawing/2014/main" id="{9E634AE3-808B-C941-AC1C-CD0D8BE82003}"/>
               </a:ext>
             </a:extLst>
           </p:cNvPr>
@@ -9503,10 +9542,10 @@
       </p:sp>
       <p:sp>
         <p:nvSpPr>
-          <p:cNvPr id="81" name="TextBox 80">
+          <p:cNvPr id="116" name="TextBox 115">
             <a:extLst>
               <a:ext uri="{FF2B5EF4-FFF2-40B4-BE49-F238E27FC236}">
-                <a16:creationId xmlns:a16="http://schemas.microsoft.com/office/drawing/2014/main" id="{A2FE8147-8B5E-E940-8165-B8E3C3D9C505}"/>
+                <a16:creationId xmlns:a16="http://schemas.microsoft.com/office/drawing/2014/main" id="{B0870B77-AC02-E74A-99E1-81A19D0A3969}"/>
               </a:ext>
             </a:extLst>
           </p:cNvPr>
@@ -9538,10 +9577,10 @@
       </p:sp>
       <p:sp>
         <p:nvSpPr>
-          <p:cNvPr id="82" name="TextBox 81">
+          <p:cNvPr id="117" name="TextBox 116">
             <a:extLst>
               <a:ext uri="{FF2B5EF4-FFF2-40B4-BE49-F238E27FC236}">
-                <a16:creationId xmlns:a16="http://schemas.microsoft.com/office/drawing/2014/main" id="{CD1902C1-6AA8-D34C-ADCF-1C29C79FF6EE}"/>
+                <a16:creationId xmlns:a16="http://schemas.microsoft.com/office/drawing/2014/main" id="{261AB000-91C2-534F-AFF0-FCFC38F42009}"/>
               </a:ext>
             </a:extLst>
           </p:cNvPr>
@@ -9571,12 +9610,54 @@
           </a:p>
         </p:txBody>
       </p:sp>
-      <p:sp>
-        <p:nvSpPr>
-          <p:cNvPr id="86" name="TextBox 85">
+      <p:cxnSp>
+        <p:nvCxnSpPr>
+          <p:cNvPr id="118" name="Straight Arrow Connector 117">
             <a:extLst>
               <a:ext uri="{FF2B5EF4-FFF2-40B4-BE49-F238E27FC236}">
-                <a16:creationId xmlns:a16="http://schemas.microsoft.com/office/drawing/2014/main" id="{3D567638-321A-8542-9648-1E033CE2F355}"/>
+                <a16:creationId xmlns:a16="http://schemas.microsoft.com/office/drawing/2014/main" id="{568221DF-CA22-A54E-B35D-1D97482E5C87}"/>
+              </a:ext>
+            </a:extLst>
+          </p:cNvPr>
+          <p:cNvCxnSpPr>
+            <a:cxnSpLocks/>
+            <a:stCxn id="73" idx="3"/>
+          </p:cNvCxnSpPr>
+          <p:nvPr/>
+        </p:nvCxnSpPr>
+        <p:spPr>
+          <a:xfrm flipH="1">
+            <a:off x="4855721" y="4341009"/>
+            <a:ext cx="861775" cy="503243"/>
+          </a:xfrm>
+          <a:prstGeom prst="straightConnector1">
+            <a:avLst/>
+          </a:prstGeom>
+          <a:ln>
+            <a:tailEnd type="triangle"/>
+          </a:ln>
+        </p:spPr>
+        <p:style>
+          <a:lnRef idx="1">
+            <a:schemeClr val="accent1"/>
+          </a:lnRef>
+          <a:fillRef idx="0">
+            <a:schemeClr val="accent1"/>
+          </a:fillRef>
+          <a:effectRef idx="0">
+            <a:schemeClr val="accent1"/>
+          </a:effectRef>
+          <a:fontRef idx="minor">
+            <a:schemeClr val="tx1"/>
+          </a:fontRef>
+        </p:style>
+      </p:cxnSp>
+      <p:sp>
+        <p:nvSpPr>
+          <p:cNvPr id="119" name="TextBox 118">
+            <a:extLst>
+              <a:ext uri="{FF2B5EF4-FFF2-40B4-BE49-F238E27FC236}">
+                <a16:creationId xmlns:a16="http://schemas.microsoft.com/office/drawing/2014/main" id="{FBD286E6-0021-CA4A-9C50-4CC02A5A0B1F}"/>
               </a:ext>
             </a:extLst>
           </p:cNvPr>
@@ -9585,8 +9666,8 @@
         </p:nvSpPr>
         <p:spPr>
           <a:xfrm>
-            <a:off x="2562401" y="637033"/>
-            <a:ext cx="7048468" cy="369332"/>
+            <a:off x="4689069" y="4396936"/>
+            <a:ext cx="718466" cy="369332"/>
           </a:xfrm>
           <a:prstGeom prst="rect">
             <a:avLst/>
@@ -9600,8 +9681,409 @@
           <a:lstStyle/>
           <a:p>
             <a:r>
-              <a:rPr lang="en-GB" u="sng" dirty="0"/>
-              <a:t>A Simplified Data Model, Showing connections between entities in the data</a:t>
+              <a:rPr lang="en-GB" dirty="0"/>
+              <a:t>Has a</a:t>
+            </a:r>
+          </a:p>
+        </p:txBody>
+      </p:sp>
+      <p:sp>
+        <p:nvSpPr>
+          <p:cNvPr id="120" name="Vertical Scroll 119">
+            <a:extLst>
+              <a:ext uri="{FF2B5EF4-FFF2-40B4-BE49-F238E27FC236}">
+                <a16:creationId xmlns:a16="http://schemas.microsoft.com/office/drawing/2014/main" id="{6E0577AE-46DD-F84B-9344-713082647739}"/>
+              </a:ext>
+            </a:extLst>
+          </p:cNvPr>
+          <p:cNvSpPr/>
+          <p:nvPr/>
+        </p:nvSpPr>
+        <p:spPr>
+          <a:xfrm>
+            <a:off x="4514127" y="4975582"/>
+            <a:ext cx="534175" cy="672864"/>
+          </a:xfrm>
+          <a:prstGeom prst="verticalScroll">
+            <a:avLst/>
+          </a:prstGeom>
+        </p:spPr>
+        <p:style>
+          <a:lnRef idx="2">
+            <a:schemeClr val="accent1">
+              <a:shade val="50000"/>
+            </a:schemeClr>
+          </a:lnRef>
+          <a:fillRef idx="1">
+            <a:schemeClr val="accent1"/>
+          </a:fillRef>
+          <a:effectRef idx="0">
+            <a:schemeClr val="accent1"/>
+          </a:effectRef>
+          <a:fontRef idx="minor">
+            <a:schemeClr val="lt1"/>
+          </a:fontRef>
+        </p:style>
+        <p:txBody>
+          <a:bodyPr rtlCol="0" anchor="ctr"/>
+          <a:lstStyle/>
+          <a:p>
+            <a:pPr algn="ctr"/>
+            <a:endParaRPr lang="en-GB"/>
+          </a:p>
+        </p:txBody>
+      </p:sp>
+      <p:sp>
+        <p:nvSpPr>
+          <p:cNvPr id="121" name="TextBox 120">
+            <a:extLst>
+              <a:ext uri="{FF2B5EF4-FFF2-40B4-BE49-F238E27FC236}">
+                <a16:creationId xmlns:a16="http://schemas.microsoft.com/office/drawing/2014/main" id="{BA861AA1-D027-F64E-8628-A8146697271B}"/>
+              </a:ext>
+            </a:extLst>
+          </p:cNvPr>
+          <p:cNvSpPr txBox="1"/>
+          <p:nvPr/>
+        </p:nvSpPr>
+        <p:spPr>
+          <a:xfrm>
+            <a:off x="4897266" y="5163083"/>
+            <a:ext cx="782778" cy="369332"/>
+          </a:xfrm>
+          <a:prstGeom prst="rect">
+            <a:avLst/>
+          </a:prstGeom>
+          <a:noFill/>
+        </p:spPr>
+        <p:txBody>
+          <a:bodyPr wrap="none" rtlCol="0">
+            <a:spAutoFit/>
+          </a:bodyPr>
+          <a:lstStyle/>
+          <a:p>
+            <a:r>
+              <a:rPr lang="en-GB" dirty="0"/>
+              <a:t>Profile</a:t>
+            </a:r>
+          </a:p>
+        </p:txBody>
+      </p:sp>
+      <p:cxnSp>
+        <p:nvCxnSpPr>
+          <p:cNvPr id="122" name="Straight Arrow Connector 121">
+            <a:extLst>
+              <a:ext uri="{FF2B5EF4-FFF2-40B4-BE49-F238E27FC236}">
+                <a16:creationId xmlns:a16="http://schemas.microsoft.com/office/drawing/2014/main" id="{E519133C-D375-CD40-B22B-85CE619262F4}"/>
+              </a:ext>
+            </a:extLst>
+          </p:cNvPr>
+          <p:cNvCxnSpPr>
+            <a:cxnSpLocks/>
+            <a:stCxn id="120" idx="1"/>
+          </p:cNvCxnSpPr>
+          <p:nvPr/>
+        </p:nvCxnSpPr>
+        <p:spPr>
+          <a:xfrm flipH="1" flipV="1">
+            <a:off x="3482111" y="5028707"/>
+            <a:ext cx="1098788" cy="283307"/>
+          </a:xfrm>
+          <a:prstGeom prst="straightConnector1">
+            <a:avLst/>
+          </a:prstGeom>
+          <a:ln>
+            <a:tailEnd type="triangle"/>
+          </a:ln>
+        </p:spPr>
+        <p:style>
+          <a:lnRef idx="1">
+            <a:schemeClr val="accent1"/>
+          </a:lnRef>
+          <a:fillRef idx="0">
+            <a:schemeClr val="accent1"/>
+          </a:fillRef>
+          <a:effectRef idx="0">
+            <a:schemeClr val="accent1"/>
+          </a:effectRef>
+          <a:fontRef idx="minor">
+            <a:schemeClr val="tx1"/>
+          </a:fontRef>
+        </p:style>
+      </p:cxnSp>
+      <p:cxnSp>
+        <p:nvCxnSpPr>
+          <p:cNvPr id="123" name="Straight Arrow Connector 122">
+            <a:extLst>
+              <a:ext uri="{FF2B5EF4-FFF2-40B4-BE49-F238E27FC236}">
+                <a16:creationId xmlns:a16="http://schemas.microsoft.com/office/drawing/2014/main" id="{ACC70579-21E3-F24B-8013-59200FC19DDB}"/>
+              </a:ext>
+            </a:extLst>
+          </p:cNvPr>
+          <p:cNvCxnSpPr>
+            <a:cxnSpLocks/>
+          </p:cNvCxnSpPr>
+          <p:nvPr/>
+        </p:nvCxnSpPr>
+        <p:spPr>
+          <a:xfrm flipH="1">
+            <a:off x="3556209" y="5347750"/>
+            <a:ext cx="1019574" cy="237508"/>
+          </a:xfrm>
+          <a:prstGeom prst="straightConnector1">
+            <a:avLst/>
+          </a:prstGeom>
+          <a:ln>
+            <a:tailEnd type="triangle"/>
+          </a:ln>
+        </p:spPr>
+        <p:style>
+          <a:lnRef idx="1">
+            <a:schemeClr val="accent1"/>
+          </a:lnRef>
+          <a:fillRef idx="0">
+            <a:schemeClr val="accent1"/>
+          </a:fillRef>
+          <a:effectRef idx="0">
+            <a:schemeClr val="accent1"/>
+          </a:effectRef>
+          <a:fontRef idx="minor">
+            <a:schemeClr val="tx1"/>
+          </a:fontRef>
+        </p:style>
+      </p:cxnSp>
+      <p:sp>
+        <p:nvSpPr>
+          <p:cNvPr id="124" name="TextBox 123">
+            <a:extLst>
+              <a:ext uri="{FF2B5EF4-FFF2-40B4-BE49-F238E27FC236}">
+                <a16:creationId xmlns:a16="http://schemas.microsoft.com/office/drawing/2014/main" id="{840A2F2C-7220-C04F-82EB-C9E34C94CE8F}"/>
+              </a:ext>
+            </a:extLst>
+          </p:cNvPr>
+          <p:cNvSpPr txBox="1"/>
+          <p:nvPr/>
+        </p:nvSpPr>
+        <p:spPr>
+          <a:xfrm>
+            <a:off x="2182812" y="4820738"/>
+            <a:ext cx="1403910" cy="369332"/>
+          </a:xfrm>
+          <a:prstGeom prst="rect">
+            <a:avLst/>
+          </a:prstGeom>
+          <a:noFill/>
+        </p:spPr>
+        <p:txBody>
+          <a:bodyPr wrap="none" rtlCol="0">
+            <a:spAutoFit/>
+          </a:bodyPr>
+          <a:lstStyle/>
+          <a:p>
+            <a:r>
+              <a:rPr lang="en-GB" dirty="0"/>
+              <a:t>Demographic</a:t>
+            </a:r>
+          </a:p>
+        </p:txBody>
+      </p:sp>
+      <p:sp>
+        <p:nvSpPr>
+          <p:cNvPr id="125" name="TextBox 124">
+            <a:extLst>
+              <a:ext uri="{FF2B5EF4-FFF2-40B4-BE49-F238E27FC236}">
+                <a16:creationId xmlns:a16="http://schemas.microsoft.com/office/drawing/2014/main" id="{7279E68C-259E-2241-9A38-284EE901D751}"/>
+              </a:ext>
+            </a:extLst>
+          </p:cNvPr>
+          <p:cNvSpPr txBox="1"/>
+          <p:nvPr/>
+        </p:nvSpPr>
+        <p:spPr>
+          <a:xfrm>
+            <a:off x="2730601" y="5288169"/>
+            <a:ext cx="997389" cy="646331"/>
+          </a:xfrm>
+          <a:prstGeom prst="rect">
+            <a:avLst/>
+          </a:prstGeom>
+          <a:noFill/>
+        </p:spPr>
+        <p:txBody>
+          <a:bodyPr wrap="none" rtlCol="0">
+            <a:spAutoFit/>
+          </a:bodyPr>
+          <a:lstStyle/>
+          <a:p>
+            <a:r>
+              <a:rPr lang="en-GB" dirty="0"/>
+              <a:t>Medical </a:t>
+            </a:r>
+          </a:p>
+          <a:p>
+            <a:r>
+              <a:rPr lang="en-GB" dirty="0"/>
+              <a:t>condition</a:t>
+            </a:r>
+          </a:p>
+        </p:txBody>
+      </p:sp>
+      <p:cxnSp>
+        <p:nvCxnSpPr>
+          <p:cNvPr id="127" name="Straight Arrow Connector 126">
+            <a:extLst>
+              <a:ext uri="{FF2B5EF4-FFF2-40B4-BE49-F238E27FC236}">
+                <a16:creationId xmlns:a16="http://schemas.microsoft.com/office/drawing/2014/main" id="{B0155D48-CF05-B147-B4AC-D49FC57B84C9}"/>
+              </a:ext>
+            </a:extLst>
+          </p:cNvPr>
+          <p:cNvCxnSpPr>
+            <a:cxnSpLocks/>
+            <a:stCxn id="94" idx="2"/>
+            <a:endCxn id="88" idx="0"/>
+          </p:cNvCxnSpPr>
+          <p:nvPr/>
+        </p:nvCxnSpPr>
+        <p:spPr>
+          <a:xfrm>
+            <a:off x="7805708" y="2116158"/>
+            <a:ext cx="24349" cy="2010203"/>
+          </a:xfrm>
+          <a:prstGeom prst="straightConnector1">
+            <a:avLst/>
+          </a:prstGeom>
+          <a:ln>
+            <a:tailEnd type="triangle"/>
+          </a:ln>
+        </p:spPr>
+        <p:style>
+          <a:lnRef idx="1">
+            <a:schemeClr val="accent1"/>
+          </a:lnRef>
+          <a:fillRef idx="0">
+            <a:schemeClr val="accent1"/>
+          </a:fillRef>
+          <a:effectRef idx="0">
+            <a:schemeClr val="accent1"/>
+          </a:effectRef>
+          <a:fontRef idx="minor">
+            <a:schemeClr val="tx1"/>
+          </a:fontRef>
+        </p:style>
+      </p:cxnSp>
+      <p:cxnSp>
+        <p:nvCxnSpPr>
+          <p:cNvPr id="129" name="Straight Arrow Connector 128">
+            <a:extLst>
+              <a:ext uri="{FF2B5EF4-FFF2-40B4-BE49-F238E27FC236}">
+                <a16:creationId xmlns:a16="http://schemas.microsoft.com/office/drawing/2014/main" id="{8144B799-3B06-6345-AFBC-06E6CAD63975}"/>
+              </a:ext>
+            </a:extLst>
+          </p:cNvPr>
+          <p:cNvCxnSpPr>
+            <a:cxnSpLocks/>
+          </p:cNvCxnSpPr>
+          <p:nvPr/>
+        </p:nvCxnSpPr>
+        <p:spPr>
+          <a:xfrm flipH="1">
+            <a:off x="6426945" y="2130458"/>
+            <a:ext cx="1322956" cy="1485650"/>
+          </a:xfrm>
+          <a:prstGeom prst="straightConnector1">
+            <a:avLst/>
+          </a:prstGeom>
+          <a:ln>
+            <a:tailEnd type="triangle"/>
+          </a:ln>
+        </p:spPr>
+        <p:style>
+          <a:lnRef idx="1">
+            <a:schemeClr val="accent1"/>
+          </a:lnRef>
+          <a:fillRef idx="0">
+            <a:schemeClr val="accent1"/>
+          </a:fillRef>
+          <a:effectRef idx="0">
+            <a:schemeClr val="accent1"/>
+          </a:effectRef>
+          <a:fontRef idx="minor">
+            <a:schemeClr val="tx1"/>
+          </a:fontRef>
+        </p:style>
+      </p:cxnSp>
+      <p:cxnSp>
+        <p:nvCxnSpPr>
+          <p:cNvPr id="130" name="Straight Arrow Connector 129">
+            <a:extLst>
+              <a:ext uri="{FF2B5EF4-FFF2-40B4-BE49-F238E27FC236}">
+                <a16:creationId xmlns:a16="http://schemas.microsoft.com/office/drawing/2014/main" id="{EEE8F098-1DEB-EC4A-A1E9-647E08780533}"/>
+              </a:ext>
+            </a:extLst>
+          </p:cNvPr>
+          <p:cNvCxnSpPr>
+            <a:cxnSpLocks/>
+            <a:endCxn id="76" idx="5"/>
+          </p:cNvCxnSpPr>
+          <p:nvPr/>
+        </p:nvCxnSpPr>
+        <p:spPr>
+          <a:xfrm flipH="1">
+            <a:off x="3992701" y="2132307"/>
+            <a:ext cx="3552026" cy="1608945"/>
+          </a:xfrm>
+          <a:prstGeom prst="straightConnector1">
+            <a:avLst/>
+          </a:prstGeom>
+          <a:ln>
+            <a:tailEnd type="triangle"/>
+          </a:ln>
+        </p:spPr>
+        <p:style>
+          <a:lnRef idx="1">
+            <a:schemeClr val="accent1"/>
+          </a:lnRef>
+          <a:fillRef idx="0">
+            <a:schemeClr val="accent1"/>
+          </a:fillRef>
+          <a:effectRef idx="0">
+            <a:schemeClr val="accent1"/>
+          </a:effectRef>
+          <a:fontRef idx="minor">
+            <a:schemeClr val="tx1"/>
+          </a:fontRef>
+        </p:style>
+      </p:cxnSp>
+      <p:sp>
+        <p:nvSpPr>
+          <p:cNvPr id="131" name="TextBox 130">
+            <a:extLst>
+              <a:ext uri="{FF2B5EF4-FFF2-40B4-BE49-F238E27FC236}">
+                <a16:creationId xmlns:a16="http://schemas.microsoft.com/office/drawing/2014/main" id="{22E07B17-85A6-D644-9E7C-B33DEF1C3638}"/>
+              </a:ext>
+            </a:extLst>
+          </p:cNvPr>
+          <p:cNvSpPr txBox="1"/>
+          <p:nvPr/>
+        </p:nvSpPr>
+        <p:spPr>
+          <a:xfrm>
+            <a:off x="6937561" y="2175139"/>
+            <a:ext cx="907621" cy="369332"/>
+          </a:xfrm>
+          <a:prstGeom prst="rect">
+            <a:avLst/>
+          </a:prstGeom>
+          <a:noFill/>
+        </p:spPr>
+        <p:txBody>
+          <a:bodyPr wrap="none" rtlCol="0">
+            <a:spAutoFit/>
+          </a:bodyPr>
+          <a:lstStyle/>
+          <a:p>
+            <a:r>
+              <a:rPr lang="en-GB" dirty="0"/>
+              <a:t>contains</a:t>
             </a:r>
           </a:p>
         </p:txBody>
@@ -9636,6 +10118,2223 @@
           <a:chExt cx="0" cy="0"/>
         </a:xfrm>
       </p:grpSpPr>
+      <p:sp>
+        <p:nvSpPr>
+          <p:cNvPr id="2" name="Smiley Face 1">
+            <a:extLst>
+              <a:ext uri="{FF2B5EF4-FFF2-40B4-BE49-F238E27FC236}">
+                <a16:creationId xmlns:a16="http://schemas.microsoft.com/office/drawing/2014/main" id="{51DABAA8-0054-4445-B285-B65FE7D2A46F}"/>
+              </a:ext>
+            </a:extLst>
+          </p:cNvPr>
+          <p:cNvSpPr/>
+          <p:nvPr/>
+        </p:nvSpPr>
+        <p:spPr>
+          <a:xfrm>
+            <a:off x="5583585" y="3560520"/>
+            <a:ext cx="914400" cy="914400"/>
+          </a:xfrm>
+          <a:prstGeom prst="smileyFace">
+            <a:avLst/>
+          </a:prstGeom>
+        </p:spPr>
+        <p:style>
+          <a:lnRef idx="2">
+            <a:schemeClr val="accent1">
+              <a:shade val="50000"/>
+            </a:schemeClr>
+          </a:lnRef>
+          <a:fillRef idx="1">
+            <a:schemeClr val="accent1"/>
+          </a:fillRef>
+          <a:effectRef idx="0">
+            <a:schemeClr val="accent1"/>
+          </a:effectRef>
+          <a:fontRef idx="minor">
+            <a:schemeClr val="lt1"/>
+          </a:fontRef>
+        </p:style>
+        <p:txBody>
+          <a:bodyPr rtlCol="0" anchor="ctr"/>
+          <a:lstStyle/>
+          <a:p>
+            <a:pPr algn="ctr"/>
+            <a:endParaRPr lang="en-GB"/>
+          </a:p>
+        </p:txBody>
+      </p:sp>
+      <p:sp>
+        <p:nvSpPr>
+          <p:cNvPr id="3" name="TextBox 2">
+            <a:extLst>
+              <a:ext uri="{FF2B5EF4-FFF2-40B4-BE49-F238E27FC236}">
+                <a16:creationId xmlns:a16="http://schemas.microsoft.com/office/drawing/2014/main" id="{BCADE005-2272-F94B-B17A-974F6C1E41ED}"/>
+              </a:ext>
+            </a:extLst>
+          </p:cNvPr>
+          <p:cNvSpPr txBox="1"/>
+          <p:nvPr/>
+        </p:nvSpPr>
+        <p:spPr>
+          <a:xfrm>
+            <a:off x="5526823" y="4412976"/>
+            <a:ext cx="1009187" cy="369332"/>
+          </a:xfrm>
+          <a:prstGeom prst="rect">
+            <a:avLst/>
+          </a:prstGeom>
+          <a:noFill/>
+        </p:spPr>
+        <p:txBody>
+          <a:bodyPr wrap="none" rtlCol="0">
+            <a:spAutoFit/>
+          </a:bodyPr>
+          <a:lstStyle/>
+          <a:p>
+            <a:r>
+              <a:rPr lang="en-GB" dirty="0"/>
+              <a:t>A Patient</a:t>
+            </a:r>
+          </a:p>
+        </p:txBody>
+      </p:sp>
+      <p:sp>
+        <p:nvSpPr>
+          <p:cNvPr id="4" name="Triangle 3">
+            <a:extLst>
+              <a:ext uri="{FF2B5EF4-FFF2-40B4-BE49-F238E27FC236}">
+                <a16:creationId xmlns:a16="http://schemas.microsoft.com/office/drawing/2014/main" id="{6AA0F5A4-513D-584D-829D-6F53DE0DDA13}"/>
+              </a:ext>
+            </a:extLst>
+          </p:cNvPr>
+          <p:cNvSpPr/>
+          <p:nvPr/>
+        </p:nvSpPr>
+        <p:spPr>
+          <a:xfrm>
+            <a:off x="3337963" y="3429000"/>
+            <a:ext cx="872984" cy="624503"/>
+          </a:xfrm>
+          <a:prstGeom prst="triangle">
+            <a:avLst/>
+          </a:prstGeom>
+        </p:spPr>
+        <p:style>
+          <a:lnRef idx="2">
+            <a:schemeClr val="accent1">
+              <a:shade val="50000"/>
+            </a:schemeClr>
+          </a:lnRef>
+          <a:fillRef idx="1">
+            <a:schemeClr val="accent1"/>
+          </a:fillRef>
+          <a:effectRef idx="0">
+            <a:schemeClr val="accent1"/>
+          </a:effectRef>
+          <a:fontRef idx="minor">
+            <a:schemeClr val="lt1"/>
+          </a:fontRef>
+        </p:style>
+        <p:txBody>
+          <a:bodyPr rtlCol="0" anchor="ctr"/>
+          <a:lstStyle/>
+          <a:p>
+            <a:pPr algn="ctr"/>
+            <a:endParaRPr lang="en-GB"/>
+          </a:p>
+        </p:txBody>
+      </p:sp>
+      <p:sp>
+        <p:nvSpPr>
+          <p:cNvPr id="5" name="TextBox 4">
+            <a:extLst>
+              <a:ext uri="{FF2B5EF4-FFF2-40B4-BE49-F238E27FC236}">
+                <a16:creationId xmlns:a16="http://schemas.microsoft.com/office/drawing/2014/main" id="{51C6F237-E5C1-744F-8CDA-7D6EFCA90273}"/>
+              </a:ext>
+            </a:extLst>
+          </p:cNvPr>
+          <p:cNvSpPr txBox="1"/>
+          <p:nvPr/>
+        </p:nvSpPr>
+        <p:spPr>
+          <a:xfrm>
+            <a:off x="3176001" y="4017720"/>
+            <a:ext cx="1030603" cy="369332"/>
+          </a:xfrm>
+          <a:prstGeom prst="rect">
+            <a:avLst/>
+          </a:prstGeom>
+          <a:noFill/>
+        </p:spPr>
+        <p:txBody>
+          <a:bodyPr wrap="none" rtlCol="0">
+            <a:spAutoFit/>
+          </a:bodyPr>
+          <a:lstStyle/>
+          <a:p>
+            <a:r>
+              <a:rPr lang="en-GB" dirty="0"/>
+              <a:t>Reactions</a:t>
+            </a:r>
+          </a:p>
+        </p:txBody>
+      </p:sp>
+      <p:cxnSp>
+        <p:nvCxnSpPr>
+          <p:cNvPr id="6" name="Straight Arrow Connector 5">
+            <a:extLst>
+              <a:ext uri="{FF2B5EF4-FFF2-40B4-BE49-F238E27FC236}">
+                <a16:creationId xmlns:a16="http://schemas.microsoft.com/office/drawing/2014/main" id="{56A50A31-93C0-D14A-8CC4-A748BA5AF8D9}"/>
+              </a:ext>
+            </a:extLst>
+          </p:cNvPr>
+          <p:cNvCxnSpPr>
+            <a:cxnSpLocks/>
+            <a:stCxn id="2" idx="2"/>
+            <a:endCxn id="4" idx="4"/>
+          </p:cNvCxnSpPr>
+          <p:nvPr/>
+        </p:nvCxnSpPr>
+        <p:spPr>
+          <a:xfrm flipH="1">
+            <a:off x="4210947" y="4017720"/>
+            <a:ext cx="1372638" cy="35783"/>
+          </a:xfrm>
+          <a:prstGeom prst="straightConnector1">
+            <a:avLst/>
+          </a:prstGeom>
+          <a:ln>
+            <a:tailEnd type="triangle"/>
+          </a:ln>
+        </p:spPr>
+        <p:style>
+          <a:lnRef idx="1">
+            <a:schemeClr val="accent1"/>
+          </a:lnRef>
+          <a:fillRef idx="0">
+            <a:schemeClr val="accent1"/>
+          </a:fillRef>
+          <a:effectRef idx="0">
+            <a:schemeClr val="accent1"/>
+          </a:effectRef>
+          <a:fontRef idx="minor">
+            <a:schemeClr val="tx1"/>
+          </a:fontRef>
+        </p:style>
+      </p:cxnSp>
+      <p:sp>
+        <p:nvSpPr>
+          <p:cNvPr id="7" name="TextBox 6">
+            <a:extLst>
+              <a:ext uri="{FF2B5EF4-FFF2-40B4-BE49-F238E27FC236}">
+                <a16:creationId xmlns:a16="http://schemas.microsoft.com/office/drawing/2014/main" id="{6432F7FB-2CC2-C544-A2BD-9169D380C8A3}"/>
+              </a:ext>
+            </a:extLst>
+          </p:cNvPr>
+          <p:cNvSpPr txBox="1"/>
+          <p:nvPr/>
+        </p:nvSpPr>
+        <p:spPr>
+          <a:xfrm>
+            <a:off x="4342719" y="3733421"/>
+            <a:ext cx="718466" cy="369332"/>
+          </a:xfrm>
+          <a:prstGeom prst="rect">
+            <a:avLst/>
+          </a:prstGeom>
+          <a:noFill/>
+        </p:spPr>
+        <p:txBody>
+          <a:bodyPr wrap="none" rtlCol="0">
+            <a:spAutoFit/>
+          </a:bodyPr>
+          <a:lstStyle/>
+          <a:p>
+            <a:r>
+              <a:rPr lang="en-GB" dirty="0"/>
+              <a:t>Has a</a:t>
+            </a:r>
+          </a:p>
+        </p:txBody>
+      </p:sp>
+      <p:sp>
+        <p:nvSpPr>
+          <p:cNvPr id="8" name="Oval 7">
+            <a:extLst>
+              <a:ext uri="{FF2B5EF4-FFF2-40B4-BE49-F238E27FC236}">
+                <a16:creationId xmlns:a16="http://schemas.microsoft.com/office/drawing/2014/main" id="{5CACF541-641A-6D45-BD68-9D124ED93540}"/>
+              </a:ext>
+            </a:extLst>
+          </p:cNvPr>
+          <p:cNvSpPr/>
+          <p:nvPr/>
+        </p:nvSpPr>
+        <p:spPr>
+          <a:xfrm>
+            <a:off x="7456034" y="4143724"/>
+            <a:ext cx="694481" cy="334606"/>
+          </a:xfrm>
+          <a:prstGeom prst="ellipse">
+            <a:avLst/>
+          </a:prstGeom>
+        </p:spPr>
+        <p:style>
+          <a:lnRef idx="2">
+            <a:schemeClr val="accent1">
+              <a:shade val="50000"/>
+            </a:schemeClr>
+          </a:lnRef>
+          <a:fillRef idx="1">
+            <a:schemeClr val="accent1"/>
+          </a:fillRef>
+          <a:effectRef idx="0">
+            <a:schemeClr val="accent1"/>
+          </a:effectRef>
+          <a:fontRef idx="minor">
+            <a:schemeClr val="lt1"/>
+          </a:fontRef>
+        </p:style>
+        <p:txBody>
+          <a:bodyPr rtlCol="0" anchor="ctr"/>
+          <a:lstStyle/>
+          <a:p>
+            <a:pPr algn="ctr"/>
+            <a:endParaRPr lang="en-GB"/>
+          </a:p>
+        </p:txBody>
+      </p:sp>
+      <p:cxnSp>
+        <p:nvCxnSpPr>
+          <p:cNvPr id="9" name="Straight Arrow Connector 8">
+            <a:extLst>
+              <a:ext uri="{FF2B5EF4-FFF2-40B4-BE49-F238E27FC236}">
+                <a16:creationId xmlns:a16="http://schemas.microsoft.com/office/drawing/2014/main" id="{228B4197-D064-1441-AA3E-C39DFB4F7FE0}"/>
+              </a:ext>
+            </a:extLst>
+          </p:cNvPr>
+          <p:cNvCxnSpPr>
+            <a:cxnSpLocks/>
+            <a:stCxn id="2" idx="6"/>
+            <a:endCxn id="8" idx="2"/>
+          </p:cNvCxnSpPr>
+          <p:nvPr/>
+        </p:nvCxnSpPr>
+        <p:spPr>
+          <a:xfrm>
+            <a:off x="6497985" y="4017720"/>
+            <a:ext cx="958049" cy="293307"/>
+          </a:xfrm>
+          <a:prstGeom prst="straightConnector1">
+            <a:avLst/>
+          </a:prstGeom>
+          <a:ln>
+            <a:tailEnd type="triangle"/>
+          </a:ln>
+        </p:spPr>
+        <p:style>
+          <a:lnRef idx="1">
+            <a:schemeClr val="accent1"/>
+          </a:lnRef>
+          <a:fillRef idx="0">
+            <a:schemeClr val="accent1"/>
+          </a:fillRef>
+          <a:effectRef idx="0">
+            <a:schemeClr val="accent1"/>
+          </a:effectRef>
+          <a:fontRef idx="minor">
+            <a:schemeClr val="tx1"/>
+          </a:fontRef>
+        </p:style>
+      </p:cxnSp>
+      <p:sp>
+        <p:nvSpPr>
+          <p:cNvPr id="10" name="TextBox 9">
+            <a:extLst>
+              <a:ext uri="{FF2B5EF4-FFF2-40B4-BE49-F238E27FC236}">
+                <a16:creationId xmlns:a16="http://schemas.microsoft.com/office/drawing/2014/main" id="{E556EC49-D6B4-2949-A153-931FAD9FB35D}"/>
+              </a:ext>
+            </a:extLst>
+          </p:cNvPr>
+          <p:cNvSpPr txBox="1"/>
+          <p:nvPr/>
+        </p:nvSpPr>
+        <p:spPr>
+          <a:xfrm>
+            <a:off x="7200570" y="4772255"/>
+            <a:ext cx="946093" cy="369332"/>
+          </a:xfrm>
+          <a:prstGeom prst="rect">
+            <a:avLst/>
+          </a:prstGeom>
+          <a:noFill/>
+        </p:spPr>
+        <p:txBody>
+          <a:bodyPr wrap="none" rtlCol="0">
+            <a:spAutoFit/>
+          </a:bodyPr>
+          <a:lstStyle/>
+          <a:p>
+            <a:r>
+              <a:rPr lang="en-GB" dirty="0"/>
+              <a:t>Is taking</a:t>
+            </a:r>
+          </a:p>
+        </p:txBody>
+      </p:sp>
+      <p:sp>
+        <p:nvSpPr>
+          <p:cNvPr id="11" name="TextBox 10">
+            <a:extLst>
+              <a:ext uri="{FF2B5EF4-FFF2-40B4-BE49-F238E27FC236}">
+                <a16:creationId xmlns:a16="http://schemas.microsoft.com/office/drawing/2014/main" id="{CCC0DD8A-EE2A-F243-A7B8-A3BA6002CD53}"/>
+              </a:ext>
+            </a:extLst>
+          </p:cNvPr>
+          <p:cNvSpPr txBox="1"/>
+          <p:nvPr/>
+        </p:nvSpPr>
+        <p:spPr>
+          <a:xfrm>
+            <a:off x="7474927" y="4126361"/>
+            <a:ext cx="710259" cy="369332"/>
+          </a:xfrm>
+          <a:prstGeom prst="rect">
+            <a:avLst/>
+          </a:prstGeom>
+          <a:noFill/>
+        </p:spPr>
+        <p:txBody>
+          <a:bodyPr wrap="none" rtlCol="0">
+            <a:spAutoFit/>
+          </a:bodyPr>
+          <a:lstStyle/>
+          <a:p>
+            <a:r>
+              <a:rPr lang="en-GB" dirty="0"/>
+              <a:t>Drugs</a:t>
+            </a:r>
+          </a:p>
+        </p:txBody>
+      </p:sp>
+      <p:sp>
+        <p:nvSpPr>
+          <p:cNvPr id="12" name="Lightning Bolt 11">
+            <a:extLst>
+              <a:ext uri="{FF2B5EF4-FFF2-40B4-BE49-F238E27FC236}">
+                <a16:creationId xmlns:a16="http://schemas.microsoft.com/office/drawing/2014/main" id="{712BB875-A289-5744-B047-A2B7D1E1F625}"/>
+              </a:ext>
+            </a:extLst>
+          </p:cNvPr>
+          <p:cNvSpPr/>
+          <p:nvPr/>
+        </p:nvSpPr>
+        <p:spPr>
+          <a:xfrm>
+            <a:off x="5804390" y="1644014"/>
+            <a:ext cx="914400" cy="914400"/>
+          </a:xfrm>
+          <a:prstGeom prst="lightningBolt">
+            <a:avLst/>
+          </a:prstGeom>
+        </p:spPr>
+        <p:style>
+          <a:lnRef idx="2">
+            <a:schemeClr val="accent1">
+              <a:shade val="50000"/>
+            </a:schemeClr>
+          </a:lnRef>
+          <a:fillRef idx="1">
+            <a:schemeClr val="accent1"/>
+          </a:fillRef>
+          <a:effectRef idx="0">
+            <a:schemeClr val="accent1"/>
+          </a:effectRef>
+          <a:fontRef idx="minor">
+            <a:schemeClr val="lt1"/>
+          </a:fontRef>
+        </p:style>
+        <p:txBody>
+          <a:bodyPr rtlCol="0" anchor="ctr"/>
+          <a:lstStyle/>
+          <a:p>
+            <a:pPr algn="ctr"/>
+            <a:endParaRPr lang="en-GB"/>
+          </a:p>
+        </p:txBody>
+      </p:sp>
+      <p:sp>
+        <p:nvSpPr>
+          <p:cNvPr id="13" name="TextBox 12">
+            <a:extLst>
+              <a:ext uri="{FF2B5EF4-FFF2-40B4-BE49-F238E27FC236}">
+                <a16:creationId xmlns:a16="http://schemas.microsoft.com/office/drawing/2014/main" id="{A986E173-6F66-1C47-B001-B2C37549073D}"/>
+              </a:ext>
+            </a:extLst>
+          </p:cNvPr>
+          <p:cNvSpPr txBox="1"/>
+          <p:nvPr/>
+        </p:nvSpPr>
+        <p:spPr>
+          <a:xfrm>
+            <a:off x="5804390" y="1274682"/>
+            <a:ext cx="660950" cy="369332"/>
+          </a:xfrm>
+          <a:prstGeom prst="rect">
+            <a:avLst/>
+          </a:prstGeom>
+          <a:noFill/>
+        </p:spPr>
+        <p:txBody>
+          <a:bodyPr wrap="none" rtlCol="0">
+            <a:spAutoFit/>
+          </a:bodyPr>
+          <a:lstStyle/>
+          <a:p>
+            <a:r>
+              <a:rPr lang="en-GB" dirty="0"/>
+              <a:t>Event</a:t>
+            </a:r>
+          </a:p>
+        </p:txBody>
+      </p:sp>
+      <p:cxnSp>
+        <p:nvCxnSpPr>
+          <p:cNvPr id="14" name="Straight Arrow Connector 13">
+            <a:extLst>
+              <a:ext uri="{FF2B5EF4-FFF2-40B4-BE49-F238E27FC236}">
+                <a16:creationId xmlns:a16="http://schemas.microsoft.com/office/drawing/2014/main" id="{C5D20986-FE7B-A242-B1A0-48BECD46DC12}"/>
+              </a:ext>
+            </a:extLst>
+          </p:cNvPr>
+          <p:cNvCxnSpPr>
+            <a:cxnSpLocks/>
+          </p:cNvCxnSpPr>
+          <p:nvPr/>
+        </p:nvCxnSpPr>
+        <p:spPr>
+          <a:xfrm>
+            <a:off x="6077270" y="2156867"/>
+            <a:ext cx="0" cy="1434044"/>
+          </a:xfrm>
+          <a:prstGeom prst="straightConnector1">
+            <a:avLst/>
+          </a:prstGeom>
+          <a:ln>
+            <a:tailEnd type="triangle"/>
+          </a:ln>
+        </p:spPr>
+        <p:style>
+          <a:lnRef idx="1">
+            <a:schemeClr val="accent1"/>
+          </a:lnRef>
+          <a:fillRef idx="0">
+            <a:schemeClr val="accent1"/>
+          </a:fillRef>
+          <a:effectRef idx="0">
+            <a:schemeClr val="accent1"/>
+          </a:effectRef>
+          <a:fontRef idx="minor">
+            <a:schemeClr val="tx1"/>
+          </a:fontRef>
+        </p:style>
+      </p:cxnSp>
+      <p:sp>
+        <p:nvSpPr>
+          <p:cNvPr id="15" name="TextBox 14">
+            <a:extLst>
+              <a:ext uri="{FF2B5EF4-FFF2-40B4-BE49-F238E27FC236}">
+                <a16:creationId xmlns:a16="http://schemas.microsoft.com/office/drawing/2014/main" id="{CF4BD941-D6B0-F34C-B491-4E7B13B52DC6}"/>
+              </a:ext>
+            </a:extLst>
+          </p:cNvPr>
+          <p:cNvSpPr txBox="1"/>
+          <p:nvPr/>
+        </p:nvSpPr>
+        <p:spPr>
+          <a:xfrm>
+            <a:off x="5154343" y="2412740"/>
+            <a:ext cx="1239442" cy="369332"/>
+          </a:xfrm>
+          <a:prstGeom prst="rect">
+            <a:avLst/>
+          </a:prstGeom>
+          <a:noFill/>
+        </p:spPr>
+        <p:txBody>
+          <a:bodyPr wrap="none" rtlCol="0">
+            <a:spAutoFit/>
+          </a:bodyPr>
+          <a:lstStyle/>
+          <a:p>
+            <a:r>
+              <a:rPr lang="en-GB" dirty="0"/>
+              <a:t>Happens to</a:t>
+            </a:r>
+          </a:p>
+        </p:txBody>
+      </p:sp>
+      <p:cxnSp>
+        <p:nvCxnSpPr>
+          <p:cNvPr id="16" name="Straight Arrow Connector 15">
+            <a:extLst>
+              <a:ext uri="{FF2B5EF4-FFF2-40B4-BE49-F238E27FC236}">
+                <a16:creationId xmlns:a16="http://schemas.microsoft.com/office/drawing/2014/main" id="{92156440-B6D9-C84D-AAE0-B81DEA800384}"/>
+              </a:ext>
+            </a:extLst>
+          </p:cNvPr>
+          <p:cNvCxnSpPr>
+            <a:cxnSpLocks/>
+            <a:stCxn id="12" idx="6"/>
+          </p:cNvCxnSpPr>
+          <p:nvPr/>
+        </p:nvCxnSpPr>
+        <p:spPr>
+          <a:xfrm flipV="1">
+            <a:off x="6348797" y="1833690"/>
+            <a:ext cx="999711" cy="67711"/>
+          </a:xfrm>
+          <a:prstGeom prst="straightConnector1">
+            <a:avLst/>
+          </a:prstGeom>
+          <a:ln>
+            <a:tailEnd type="triangle"/>
+          </a:ln>
+        </p:spPr>
+        <p:style>
+          <a:lnRef idx="1">
+            <a:schemeClr val="accent1"/>
+          </a:lnRef>
+          <a:fillRef idx="0">
+            <a:schemeClr val="accent1"/>
+          </a:fillRef>
+          <a:effectRef idx="0">
+            <a:schemeClr val="accent1"/>
+          </a:effectRef>
+          <a:fontRef idx="minor">
+            <a:schemeClr val="tx1"/>
+          </a:fontRef>
+        </p:style>
+      </p:cxnSp>
+      <p:sp>
+        <p:nvSpPr>
+          <p:cNvPr id="17" name="Predefined Process 16">
+            <a:extLst>
+              <a:ext uri="{FF2B5EF4-FFF2-40B4-BE49-F238E27FC236}">
+                <a16:creationId xmlns:a16="http://schemas.microsoft.com/office/drawing/2014/main" id="{22426472-5FA0-C646-BFAD-4FCC57D79250}"/>
+              </a:ext>
+            </a:extLst>
+          </p:cNvPr>
+          <p:cNvSpPr/>
+          <p:nvPr/>
+        </p:nvSpPr>
+        <p:spPr>
+          <a:xfrm>
+            <a:off x="7348508" y="1503510"/>
+            <a:ext cx="914400" cy="612648"/>
+          </a:xfrm>
+          <a:prstGeom prst="flowChartPredefinedProcess">
+            <a:avLst/>
+          </a:prstGeom>
+        </p:spPr>
+        <p:style>
+          <a:lnRef idx="2">
+            <a:schemeClr val="accent1">
+              <a:shade val="50000"/>
+            </a:schemeClr>
+          </a:lnRef>
+          <a:fillRef idx="1">
+            <a:schemeClr val="accent1"/>
+          </a:fillRef>
+          <a:effectRef idx="0">
+            <a:schemeClr val="accent1"/>
+          </a:effectRef>
+          <a:fontRef idx="minor">
+            <a:schemeClr val="lt1"/>
+          </a:fontRef>
+        </p:style>
+        <p:txBody>
+          <a:bodyPr rtlCol="0" anchor="ctr"/>
+          <a:lstStyle/>
+          <a:p>
+            <a:pPr algn="ctr"/>
+            <a:endParaRPr lang="en-GB"/>
+          </a:p>
+        </p:txBody>
+      </p:sp>
+      <p:sp>
+        <p:nvSpPr>
+          <p:cNvPr id="18" name="TextBox 17">
+            <a:extLst>
+              <a:ext uri="{FF2B5EF4-FFF2-40B4-BE49-F238E27FC236}">
+                <a16:creationId xmlns:a16="http://schemas.microsoft.com/office/drawing/2014/main" id="{37026ACC-B287-B148-80ED-8CF78E47917B}"/>
+              </a:ext>
+            </a:extLst>
+          </p:cNvPr>
+          <p:cNvSpPr txBox="1"/>
+          <p:nvPr/>
+        </p:nvSpPr>
+        <p:spPr>
+          <a:xfrm>
+            <a:off x="7218446" y="1026631"/>
+            <a:ext cx="966740" cy="369332"/>
+          </a:xfrm>
+          <a:prstGeom prst="rect">
+            <a:avLst/>
+          </a:prstGeom>
+          <a:noFill/>
+        </p:spPr>
+        <p:txBody>
+          <a:bodyPr wrap="none" rtlCol="0">
+            <a:spAutoFit/>
+          </a:bodyPr>
+          <a:lstStyle/>
+          <a:p>
+            <a:r>
+              <a:rPr lang="en-GB" dirty="0"/>
+              <a:t>A report</a:t>
+            </a:r>
+          </a:p>
+        </p:txBody>
+      </p:sp>
+      <p:cxnSp>
+        <p:nvCxnSpPr>
+          <p:cNvPr id="19" name="Straight Arrow Connector 18">
+            <a:extLst>
+              <a:ext uri="{FF2B5EF4-FFF2-40B4-BE49-F238E27FC236}">
+                <a16:creationId xmlns:a16="http://schemas.microsoft.com/office/drawing/2014/main" id="{65F9986F-3CC0-2544-B6B2-8F83AF07CB33}"/>
+              </a:ext>
+            </a:extLst>
+          </p:cNvPr>
+          <p:cNvCxnSpPr>
+            <a:cxnSpLocks/>
+            <a:stCxn id="17" idx="3"/>
+          </p:cNvCxnSpPr>
+          <p:nvPr/>
+        </p:nvCxnSpPr>
+        <p:spPr>
+          <a:xfrm>
+            <a:off x="8262908" y="1809834"/>
+            <a:ext cx="855693" cy="44886"/>
+          </a:xfrm>
+          <a:prstGeom prst="straightConnector1">
+            <a:avLst/>
+          </a:prstGeom>
+          <a:ln>
+            <a:tailEnd type="triangle"/>
+          </a:ln>
+        </p:spPr>
+        <p:style>
+          <a:lnRef idx="1">
+            <a:schemeClr val="accent1"/>
+          </a:lnRef>
+          <a:fillRef idx="0">
+            <a:schemeClr val="accent1"/>
+          </a:fillRef>
+          <a:effectRef idx="0">
+            <a:schemeClr val="accent1"/>
+          </a:effectRef>
+          <a:fontRef idx="minor">
+            <a:schemeClr val="tx1"/>
+          </a:fontRef>
+        </p:style>
+      </p:cxnSp>
+      <p:sp>
+        <p:nvSpPr>
+          <p:cNvPr id="20" name="Horizontal Scroll 19">
+            <a:extLst>
+              <a:ext uri="{FF2B5EF4-FFF2-40B4-BE49-F238E27FC236}">
+                <a16:creationId xmlns:a16="http://schemas.microsoft.com/office/drawing/2014/main" id="{62A10633-5F4F-834F-9AE3-7E6CB9B50482}"/>
+              </a:ext>
+            </a:extLst>
+          </p:cNvPr>
+          <p:cNvSpPr/>
+          <p:nvPr/>
+        </p:nvSpPr>
+        <p:spPr>
+          <a:xfrm>
+            <a:off x="9292242" y="1576733"/>
+            <a:ext cx="837433" cy="665668"/>
+          </a:xfrm>
+          <a:prstGeom prst="horizontalScroll">
+            <a:avLst/>
+          </a:prstGeom>
+        </p:spPr>
+        <p:style>
+          <a:lnRef idx="2">
+            <a:schemeClr val="accent1">
+              <a:shade val="50000"/>
+            </a:schemeClr>
+          </a:lnRef>
+          <a:fillRef idx="1">
+            <a:schemeClr val="accent1"/>
+          </a:fillRef>
+          <a:effectRef idx="0">
+            <a:schemeClr val="accent1"/>
+          </a:effectRef>
+          <a:fontRef idx="minor">
+            <a:schemeClr val="lt1"/>
+          </a:fontRef>
+        </p:style>
+        <p:txBody>
+          <a:bodyPr rtlCol="0" anchor="ctr"/>
+          <a:lstStyle/>
+          <a:p>
+            <a:pPr algn="ctr"/>
+            <a:endParaRPr lang="en-GB"/>
+          </a:p>
+        </p:txBody>
+      </p:sp>
+      <p:sp>
+        <p:nvSpPr>
+          <p:cNvPr id="21" name="TextBox 20">
+            <a:extLst>
+              <a:ext uri="{FF2B5EF4-FFF2-40B4-BE49-F238E27FC236}">
+                <a16:creationId xmlns:a16="http://schemas.microsoft.com/office/drawing/2014/main" id="{F9127F1F-59DD-DD44-8DC0-26484AA6F695}"/>
+              </a:ext>
+            </a:extLst>
+          </p:cNvPr>
+          <p:cNvSpPr txBox="1"/>
+          <p:nvPr/>
+        </p:nvSpPr>
+        <p:spPr>
+          <a:xfrm>
+            <a:off x="8524542" y="1440502"/>
+            <a:ext cx="603242" cy="369332"/>
+          </a:xfrm>
+          <a:prstGeom prst="rect">
+            <a:avLst/>
+          </a:prstGeom>
+          <a:noFill/>
+        </p:spPr>
+        <p:txBody>
+          <a:bodyPr wrap="none" rtlCol="0">
+            <a:spAutoFit/>
+          </a:bodyPr>
+          <a:lstStyle/>
+          <a:p>
+            <a:r>
+              <a:rPr lang="en-GB" dirty="0"/>
+              <a:t>from</a:t>
+            </a:r>
+          </a:p>
+        </p:txBody>
+      </p:sp>
+      <p:sp>
+        <p:nvSpPr>
+          <p:cNvPr id="22" name="Rectangle 21">
+            <a:extLst>
+              <a:ext uri="{FF2B5EF4-FFF2-40B4-BE49-F238E27FC236}">
+                <a16:creationId xmlns:a16="http://schemas.microsoft.com/office/drawing/2014/main" id="{ADAD27DA-B147-D645-8C18-2840AE643A32}"/>
+              </a:ext>
+            </a:extLst>
+          </p:cNvPr>
+          <p:cNvSpPr/>
+          <p:nvPr/>
+        </p:nvSpPr>
+        <p:spPr>
+          <a:xfrm>
+            <a:off x="9196961" y="2156867"/>
+            <a:ext cx="1796517" cy="369332"/>
+          </a:xfrm>
+          <a:prstGeom prst="rect">
+            <a:avLst/>
+          </a:prstGeom>
+        </p:spPr>
+        <p:txBody>
+          <a:bodyPr wrap="none">
+            <a:spAutoFit/>
+          </a:bodyPr>
+          <a:lstStyle/>
+          <a:p>
+            <a:r>
+              <a:rPr lang="en-GB" dirty="0"/>
+              <a:t>In country agency</a:t>
+            </a:r>
+          </a:p>
+        </p:txBody>
+      </p:sp>
+      <p:cxnSp>
+        <p:nvCxnSpPr>
+          <p:cNvPr id="23" name="Straight Arrow Connector 22">
+            <a:extLst>
+              <a:ext uri="{FF2B5EF4-FFF2-40B4-BE49-F238E27FC236}">
+                <a16:creationId xmlns:a16="http://schemas.microsoft.com/office/drawing/2014/main" id="{AF73726D-E287-964E-898D-A56BE4F66F80}"/>
+              </a:ext>
+            </a:extLst>
+          </p:cNvPr>
+          <p:cNvCxnSpPr>
+            <a:cxnSpLocks/>
+            <a:stCxn id="8" idx="7"/>
+            <a:endCxn id="27" idx="1"/>
+          </p:cNvCxnSpPr>
+          <p:nvPr/>
+        </p:nvCxnSpPr>
+        <p:spPr>
+          <a:xfrm flipV="1">
+            <a:off x="8048811" y="3555583"/>
+            <a:ext cx="1349037" cy="637143"/>
+          </a:xfrm>
+          <a:prstGeom prst="straightConnector1">
+            <a:avLst/>
+          </a:prstGeom>
+          <a:ln>
+            <a:tailEnd type="triangle"/>
+          </a:ln>
+        </p:spPr>
+        <p:style>
+          <a:lnRef idx="1">
+            <a:schemeClr val="accent1"/>
+          </a:lnRef>
+          <a:fillRef idx="0">
+            <a:schemeClr val="accent1"/>
+          </a:fillRef>
+          <a:effectRef idx="0">
+            <a:schemeClr val="accent1"/>
+          </a:effectRef>
+          <a:fontRef idx="minor">
+            <a:schemeClr val="tx1"/>
+          </a:fontRef>
+        </p:style>
+      </p:cxnSp>
+      <p:cxnSp>
+        <p:nvCxnSpPr>
+          <p:cNvPr id="24" name="Straight Arrow Connector 23">
+            <a:extLst>
+              <a:ext uri="{FF2B5EF4-FFF2-40B4-BE49-F238E27FC236}">
+                <a16:creationId xmlns:a16="http://schemas.microsoft.com/office/drawing/2014/main" id="{125D2A89-474A-9B49-8DEC-8DE7FE4FC06C}"/>
+              </a:ext>
+            </a:extLst>
+          </p:cNvPr>
+          <p:cNvCxnSpPr>
+            <a:cxnSpLocks/>
+            <a:stCxn id="8" idx="6"/>
+            <a:endCxn id="28" idx="1"/>
+          </p:cNvCxnSpPr>
+          <p:nvPr/>
+        </p:nvCxnSpPr>
+        <p:spPr>
+          <a:xfrm flipV="1">
+            <a:off x="8150515" y="4135112"/>
+            <a:ext cx="1266226" cy="175915"/>
+          </a:xfrm>
+          <a:prstGeom prst="straightConnector1">
+            <a:avLst/>
+          </a:prstGeom>
+          <a:ln>
+            <a:tailEnd type="triangle"/>
+          </a:ln>
+        </p:spPr>
+        <p:style>
+          <a:lnRef idx="1">
+            <a:schemeClr val="accent1"/>
+          </a:lnRef>
+          <a:fillRef idx="0">
+            <a:schemeClr val="accent1"/>
+          </a:fillRef>
+          <a:effectRef idx="0">
+            <a:schemeClr val="accent1"/>
+          </a:effectRef>
+          <a:fontRef idx="minor">
+            <a:schemeClr val="tx1"/>
+          </a:fontRef>
+        </p:style>
+      </p:cxnSp>
+      <p:sp>
+        <p:nvSpPr>
+          <p:cNvPr id="25" name="Rectangle 24">
+            <a:extLst>
+              <a:ext uri="{FF2B5EF4-FFF2-40B4-BE49-F238E27FC236}">
+                <a16:creationId xmlns:a16="http://schemas.microsoft.com/office/drawing/2014/main" id="{CA07BF62-F60C-E840-94B6-BB44A4C0FD3C}"/>
+              </a:ext>
+            </a:extLst>
+          </p:cNvPr>
+          <p:cNvSpPr/>
+          <p:nvPr/>
+        </p:nvSpPr>
+        <p:spPr>
+          <a:xfrm>
+            <a:off x="9397848" y="3381065"/>
+            <a:ext cx="1706047" cy="285583"/>
+          </a:xfrm>
+          <a:prstGeom prst="rect">
+            <a:avLst/>
+          </a:prstGeom>
+        </p:spPr>
+        <p:style>
+          <a:lnRef idx="2">
+            <a:schemeClr val="accent1">
+              <a:shade val="50000"/>
+            </a:schemeClr>
+          </a:lnRef>
+          <a:fillRef idx="1">
+            <a:schemeClr val="accent1"/>
+          </a:fillRef>
+          <a:effectRef idx="0">
+            <a:schemeClr val="accent1"/>
+          </a:effectRef>
+          <a:fontRef idx="minor">
+            <a:schemeClr val="lt1"/>
+          </a:fontRef>
+        </p:style>
+        <p:txBody>
+          <a:bodyPr rtlCol="0" anchor="ctr"/>
+          <a:lstStyle/>
+          <a:p>
+            <a:pPr algn="ctr"/>
+            <a:endParaRPr lang="en-GB"/>
+          </a:p>
+        </p:txBody>
+      </p:sp>
+      <p:sp>
+        <p:nvSpPr>
+          <p:cNvPr id="26" name="Rectangle 25">
+            <a:extLst>
+              <a:ext uri="{FF2B5EF4-FFF2-40B4-BE49-F238E27FC236}">
+                <a16:creationId xmlns:a16="http://schemas.microsoft.com/office/drawing/2014/main" id="{68A6433F-0820-DF41-83DB-923531C66826}"/>
+              </a:ext>
+            </a:extLst>
+          </p:cNvPr>
+          <p:cNvSpPr/>
+          <p:nvPr/>
+        </p:nvSpPr>
+        <p:spPr>
+          <a:xfrm>
+            <a:off x="9416741" y="4034195"/>
+            <a:ext cx="1411147" cy="285583"/>
+          </a:xfrm>
+          <a:prstGeom prst="rect">
+            <a:avLst/>
+          </a:prstGeom>
+        </p:spPr>
+        <p:style>
+          <a:lnRef idx="2">
+            <a:schemeClr val="accent1">
+              <a:shade val="50000"/>
+            </a:schemeClr>
+          </a:lnRef>
+          <a:fillRef idx="1">
+            <a:schemeClr val="accent1"/>
+          </a:fillRef>
+          <a:effectRef idx="0">
+            <a:schemeClr val="accent1"/>
+          </a:effectRef>
+          <a:fontRef idx="minor">
+            <a:schemeClr val="lt1"/>
+          </a:fontRef>
+        </p:style>
+        <p:txBody>
+          <a:bodyPr rtlCol="0" anchor="ctr"/>
+          <a:lstStyle/>
+          <a:p>
+            <a:pPr algn="ctr"/>
+            <a:endParaRPr lang="en-GB" dirty="0"/>
+          </a:p>
+        </p:txBody>
+      </p:sp>
+      <p:sp>
+        <p:nvSpPr>
+          <p:cNvPr id="27" name="TextBox 26">
+            <a:extLst>
+              <a:ext uri="{FF2B5EF4-FFF2-40B4-BE49-F238E27FC236}">
+                <a16:creationId xmlns:a16="http://schemas.microsoft.com/office/drawing/2014/main" id="{EC763E80-542D-9F4B-A920-20BEF3622CF6}"/>
+              </a:ext>
+            </a:extLst>
+          </p:cNvPr>
+          <p:cNvSpPr txBox="1"/>
+          <p:nvPr/>
+        </p:nvSpPr>
+        <p:spPr>
+          <a:xfrm>
+            <a:off x="9397848" y="3370917"/>
+            <a:ext cx="1290097" cy="369332"/>
+          </a:xfrm>
+          <a:prstGeom prst="rect">
+            <a:avLst/>
+          </a:prstGeom>
+          <a:noFill/>
+        </p:spPr>
+        <p:txBody>
+          <a:bodyPr wrap="none" rtlCol="0">
+            <a:spAutoFit/>
+          </a:bodyPr>
+          <a:lstStyle/>
+          <a:p>
+            <a:r>
+              <a:rPr lang="en-GB" dirty="0"/>
+              <a:t>Brand name</a:t>
+            </a:r>
+          </a:p>
+        </p:txBody>
+      </p:sp>
+      <p:sp>
+        <p:nvSpPr>
+          <p:cNvPr id="28" name="TextBox 27">
+            <a:extLst>
+              <a:ext uri="{FF2B5EF4-FFF2-40B4-BE49-F238E27FC236}">
+                <a16:creationId xmlns:a16="http://schemas.microsoft.com/office/drawing/2014/main" id="{EA988A75-F572-0044-8FB0-E41EC892DBF9}"/>
+              </a:ext>
+            </a:extLst>
+          </p:cNvPr>
+          <p:cNvSpPr txBox="1"/>
+          <p:nvPr/>
+        </p:nvSpPr>
+        <p:spPr>
+          <a:xfrm>
+            <a:off x="9416741" y="3950446"/>
+            <a:ext cx="1471878" cy="369332"/>
+          </a:xfrm>
+          <a:prstGeom prst="rect">
+            <a:avLst/>
+          </a:prstGeom>
+          <a:noFill/>
+        </p:spPr>
+        <p:txBody>
+          <a:bodyPr wrap="none" rtlCol="0">
+            <a:spAutoFit/>
+          </a:bodyPr>
+          <a:lstStyle/>
+          <a:p>
+            <a:r>
+              <a:rPr lang="en-GB" dirty="0"/>
+              <a:t>Generic name</a:t>
+            </a:r>
+          </a:p>
+        </p:txBody>
+      </p:sp>
+      <p:sp>
+        <p:nvSpPr>
+          <p:cNvPr id="29" name="Rectangle 28">
+            <a:extLst>
+              <a:ext uri="{FF2B5EF4-FFF2-40B4-BE49-F238E27FC236}">
+                <a16:creationId xmlns:a16="http://schemas.microsoft.com/office/drawing/2014/main" id="{C2D24DEF-AC25-2444-9CC0-B0EA47AB5CEC}"/>
+              </a:ext>
+            </a:extLst>
+          </p:cNvPr>
+          <p:cNvSpPr/>
+          <p:nvPr/>
+        </p:nvSpPr>
+        <p:spPr>
+          <a:xfrm>
+            <a:off x="9509403" y="4832791"/>
+            <a:ext cx="1411147" cy="285583"/>
+          </a:xfrm>
+          <a:prstGeom prst="rect">
+            <a:avLst/>
+          </a:prstGeom>
+        </p:spPr>
+        <p:style>
+          <a:lnRef idx="2">
+            <a:schemeClr val="accent1">
+              <a:shade val="50000"/>
+            </a:schemeClr>
+          </a:lnRef>
+          <a:fillRef idx="1">
+            <a:schemeClr val="accent1"/>
+          </a:fillRef>
+          <a:effectRef idx="0">
+            <a:schemeClr val="accent1"/>
+          </a:effectRef>
+          <a:fontRef idx="minor">
+            <a:schemeClr val="lt1"/>
+          </a:fontRef>
+        </p:style>
+        <p:txBody>
+          <a:bodyPr rtlCol="0" anchor="ctr"/>
+          <a:lstStyle/>
+          <a:p>
+            <a:pPr algn="ctr"/>
+            <a:endParaRPr lang="en-GB" dirty="0"/>
+          </a:p>
+        </p:txBody>
+      </p:sp>
+      <p:sp>
+        <p:nvSpPr>
+          <p:cNvPr id="30" name="TextBox 29">
+            <a:extLst>
+              <a:ext uri="{FF2B5EF4-FFF2-40B4-BE49-F238E27FC236}">
+                <a16:creationId xmlns:a16="http://schemas.microsoft.com/office/drawing/2014/main" id="{E30442FF-0905-9245-BF1D-C14672BD075A}"/>
+              </a:ext>
+            </a:extLst>
+          </p:cNvPr>
+          <p:cNvSpPr txBox="1"/>
+          <p:nvPr/>
+        </p:nvSpPr>
+        <p:spPr>
+          <a:xfrm>
+            <a:off x="9594736" y="4830116"/>
+            <a:ext cx="907621" cy="369332"/>
+          </a:xfrm>
+          <a:prstGeom prst="rect">
+            <a:avLst/>
+          </a:prstGeom>
+          <a:noFill/>
+        </p:spPr>
+        <p:txBody>
+          <a:bodyPr wrap="none" rtlCol="0">
+            <a:spAutoFit/>
+          </a:bodyPr>
+          <a:lstStyle/>
+          <a:p>
+            <a:r>
+              <a:rPr lang="en-GB" dirty="0"/>
+              <a:t>contents</a:t>
+            </a:r>
+          </a:p>
+        </p:txBody>
+      </p:sp>
+      <p:cxnSp>
+        <p:nvCxnSpPr>
+          <p:cNvPr id="31" name="Straight Arrow Connector 30">
+            <a:extLst>
+              <a:ext uri="{FF2B5EF4-FFF2-40B4-BE49-F238E27FC236}">
+                <a16:creationId xmlns:a16="http://schemas.microsoft.com/office/drawing/2014/main" id="{F6B36502-11E4-2541-9DDF-55966B24A33F}"/>
+              </a:ext>
+            </a:extLst>
+          </p:cNvPr>
+          <p:cNvCxnSpPr>
+            <a:cxnSpLocks/>
+            <a:stCxn id="8" idx="5"/>
+            <a:endCxn id="29" idx="1"/>
+          </p:cNvCxnSpPr>
+          <p:nvPr/>
+        </p:nvCxnSpPr>
+        <p:spPr>
+          <a:xfrm>
+            <a:off x="8048811" y="4429328"/>
+            <a:ext cx="1460592" cy="546255"/>
+          </a:xfrm>
+          <a:prstGeom prst="straightConnector1">
+            <a:avLst/>
+          </a:prstGeom>
+          <a:ln>
+            <a:tailEnd type="triangle"/>
+          </a:ln>
+        </p:spPr>
+        <p:style>
+          <a:lnRef idx="1">
+            <a:schemeClr val="accent1"/>
+          </a:lnRef>
+          <a:fillRef idx="0">
+            <a:schemeClr val="accent1"/>
+          </a:fillRef>
+          <a:effectRef idx="0">
+            <a:schemeClr val="accent1"/>
+          </a:effectRef>
+          <a:fontRef idx="minor">
+            <a:schemeClr val="tx1"/>
+          </a:fontRef>
+        </p:style>
+      </p:cxnSp>
+      <p:sp>
+        <p:nvSpPr>
+          <p:cNvPr id="32" name="TextBox 31">
+            <a:extLst>
+              <a:ext uri="{FF2B5EF4-FFF2-40B4-BE49-F238E27FC236}">
+                <a16:creationId xmlns:a16="http://schemas.microsoft.com/office/drawing/2014/main" id="{26042CC5-2D6F-1840-832C-4229594B27E8}"/>
+              </a:ext>
+            </a:extLst>
+          </p:cNvPr>
+          <p:cNvSpPr txBox="1"/>
+          <p:nvPr/>
+        </p:nvSpPr>
+        <p:spPr>
+          <a:xfrm>
+            <a:off x="6484089" y="1472117"/>
+            <a:ext cx="718466" cy="369332"/>
+          </a:xfrm>
+          <a:prstGeom prst="rect">
+            <a:avLst/>
+          </a:prstGeom>
+          <a:noFill/>
+        </p:spPr>
+        <p:txBody>
+          <a:bodyPr wrap="none" rtlCol="0">
+            <a:spAutoFit/>
+          </a:bodyPr>
+          <a:lstStyle/>
+          <a:p>
+            <a:r>
+              <a:rPr lang="en-GB" dirty="0"/>
+              <a:t>Has a</a:t>
+            </a:r>
+          </a:p>
+        </p:txBody>
+      </p:sp>
+      <p:sp>
+        <p:nvSpPr>
+          <p:cNvPr id="33" name="TextBox 32">
+            <a:extLst>
+              <a:ext uri="{FF2B5EF4-FFF2-40B4-BE49-F238E27FC236}">
+                <a16:creationId xmlns:a16="http://schemas.microsoft.com/office/drawing/2014/main" id="{4AE38232-443D-294E-AD55-0287AB835DB7}"/>
+              </a:ext>
+            </a:extLst>
+          </p:cNvPr>
+          <p:cNvSpPr txBox="1"/>
+          <p:nvPr/>
+        </p:nvSpPr>
+        <p:spPr>
+          <a:xfrm>
+            <a:off x="8525351" y="3870568"/>
+            <a:ext cx="718466" cy="369332"/>
+          </a:xfrm>
+          <a:prstGeom prst="rect">
+            <a:avLst/>
+          </a:prstGeom>
+          <a:noFill/>
+        </p:spPr>
+        <p:txBody>
+          <a:bodyPr wrap="none" rtlCol="0">
+            <a:spAutoFit/>
+          </a:bodyPr>
+          <a:lstStyle/>
+          <a:p>
+            <a:r>
+              <a:rPr lang="en-GB" dirty="0"/>
+              <a:t>Has a</a:t>
+            </a:r>
+          </a:p>
+        </p:txBody>
+      </p:sp>
+      <p:sp>
+        <p:nvSpPr>
+          <p:cNvPr id="34" name="TextBox 33">
+            <a:extLst>
+              <a:ext uri="{FF2B5EF4-FFF2-40B4-BE49-F238E27FC236}">
+                <a16:creationId xmlns:a16="http://schemas.microsoft.com/office/drawing/2014/main" id="{7DEEA2B0-149D-9245-9BD4-397FE50CC02A}"/>
+              </a:ext>
+            </a:extLst>
+          </p:cNvPr>
+          <p:cNvSpPr txBox="1"/>
+          <p:nvPr/>
+        </p:nvSpPr>
+        <p:spPr>
+          <a:xfrm>
+            <a:off x="2510830" y="3523856"/>
+            <a:ext cx="718466" cy="369332"/>
+          </a:xfrm>
+          <a:prstGeom prst="rect">
+            <a:avLst/>
+          </a:prstGeom>
+          <a:noFill/>
+        </p:spPr>
+        <p:txBody>
+          <a:bodyPr wrap="none" rtlCol="0">
+            <a:spAutoFit/>
+          </a:bodyPr>
+          <a:lstStyle/>
+          <a:p>
+            <a:r>
+              <a:rPr lang="en-GB" dirty="0"/>
+              <a:t>Has a</a:t>
+            </a:r>
+          </a:p>
+        </p:txBody>
+      </p:sp>
+      <p:cxnSp>
+        <p:nvCxnSpPr>
+          <p:cNvPr id="35" name="Straight Arrow Connector 34">
+            <a:extLst>
+              <a:ext uri="{FF2B5EF4-FFF2-40B4-BE49-F238E27FC236}">
+                <a16:creationId xmlns:a16="http://schemas.microsoft.com/office/drawing/2014/main" id="{8273D1C4-E942-C246-A84D-0A73C2F135B8}"/>
+              </a:ext>
+            </a:extLst>
+          </p:cNvPr>
+          <p:cNvCxnSpPr>
+            <a:cxnSpLocks/>
+          </p:cNvCxnSpPr>
+          <p:nvPr/>
+        </p:nvCxnSpPr>
+        <p:spPr>
+          <a:xfrm flipH="1" flipV="1">
+            <a:off x="2376503" y="3444774"/>
+            <a:ext cx="1252346" cy="214927"/>
+          </a:xfrm>
+          <a:prstGeom prst="straightConnector1">
+            <a:avLst/>
+          </a:prstGeom>
+          <a:ln>
+            <a:tailEnd type="triangle"/>
+          </a:ln>
+        </p:spPr>
+        <p:style>
+          <a:lnRef idx="1">
+            <a:schemeClr val="accent1"/>
+          </a:lnRef>
+          <a:fillRef idx="0">
+            <a:schemeClr val="accent1"/>
+          </a:fillRef>
+          <a:effectRef idx="0">
+            <a:schemeClr val="accent1"/>
+          </a:effectRef>
+          <a:fontRef idx="minor">
+            <a:schemeClr val="tx1"/>
+          </a:fontRef>
+        </p:style>
+      </p:cxnSp>
+      <p:cxnSp>
+        <p:nvCxnSpPr>
+          <p:cNvPr id="36" name="Straight Arrow Connector 35">
+            <a:extLst>
+              <a:ext uri="{FF2B5EF4-FFF2-40B4-BE49-F238E27FC236}">
+                <a16:creationId xmlns:a16="http://schemas.microsoft.com/office/drawing/2014/main" id="{C65D626E-A25D-0D4E-AEA5-59A0B3F6F4B0}"/>
+              </a:ext>
+            </a:extLst>
+          </p:cNvPr>
+          <p:cNvCxnSpPr>
+            <a:cxnSpLocks/>
+            <a:stCxn id="4" idx="1"/>
+          </p:cNvCxnSpPr>
+          <p:nvPr/>
+        </p:nvCxnSpPr>
+        <p:spPr>
+          <a:xfrm flipH="1">
+            <a:off x="2526884" y="3741252"/>
+            <a:ext cx="1029325" cy="385109"/>
+          </a:xfrm>
+          <a:prstGeom prst="straightConnector1">
+            <a:avLst/>
+          </a:prstGeom>
+          <a:ln>
+            <a:tailEnd type="triangle"/>
+          </a:ln>
+        </p:spPr>
+        <p:style>
+          <a:lnRef idx="1">
+            <a:schemeClr val="accent1"/>
+          </a:lnRef>
+          <a:fillRef idx="0">
+            <a:schemeClr val="accent1"/>
+          </a:fillRef>
+          <a:effectRef idx="0">
+            <a:schemeClr val="accent1"/>
+          </a:effectRef>
+          <a:fontRef idx="minor">
+            <a:schemeClr val="tx1"/>
+          </a:fontRef>
+        </p:style>
+      </p:cxnSp>
+      <p:sp>
+        <p:nvSpPr>
+          <p:cNvPr id="37" name="Rectangle 36">
+            <a:extLst>
+              <a:ext uri="{FF2B5EF4-FFF2-40B4-BE49-F238E27FC236}">
+                <a16:creationId xmlns:a16="http://schemas.microsoft.com/office/drawing/2014/main" id="{C2F67FFD-8A02-D340-80A1-C29BC8140B5F}"/>
+              </a:ext>
+            </a:extLst>
+          </p:cNvPr>
+          <p:cNvSpPr/>
+          <p:nvPr/>
+        </p:nvSpPr>
+        <p:spPr>
+          <a:xfrm>
+            <a:off x="651031" y="3228125"/>
+            <a:ext cx="1706047" cy="285583"/>
+          </a:xfrm>
+          <a:prstGeom prst="rect">
+            <a:avLst/>
+          </a:prstGeom>
+        </p:spPr>
+        <p:style>
+          <a:lnRef idx="2">
+            <a:schemeClr val="accent1">
+              <a:shade val="50000"/>
+            </a:schemeClr>
+          </a:lnRef>
+          <a:fillRef idx="1">
+            <a:schemeClr val="accent1"/>
+          </a:fillRef>
+          <a:effectRef idx="0">
+            <a:schemeClr val="accent1"/>
+          </a:effectRef>
+          <a:fontRef idx="minor">
+            <a:schemeClr val="lt1"/>
+          </a:fontRef>
+        </p:style>
+        <p:txBody>
+          <a:bodyPr rtlCol="0" anchor="ctr"/>
+          <a:lstStyle/>
+          <a:p>
+            <a:pPr algn="ctr"/>
+            <a:endParaRPr lang="en-GB"/>
+          </a:p>
+        </p:txBody>
+      </p:sp>
+      <p:sp>
+        <p:nvSpPr>
+          <p:cNvPr id="38" name="Rectangle 37">
+            <a:extLst>
+              <a:ext uri="{FF2B5EF4-FFF2-40B4-BE49-F238E27FC236}">
+                <a16:creationId xmlns:a16="http://schemas.microsoft.com/office/drawing/2014/main" id="{DE770D7C-8226-6946-A53E-169A36766B57}"/>
+              </a:ext>
+            </a:extLst>
+          </p:cNvPr>
+          <p:cNvSpPr/>
+          <p:nvPr/>
+        </p:nvSpPr>
+        <p:spPr>
+          <a:xfrm>
+            <a:off x="792430" y="4087897"/>
+            <a:ext cx="1706047" cy="285583"/>
+          </a:xfrm>
+          <a:prstGeom prst="rect">
+            <a:avLst/>
+          </a:prstGeom>
+        </p:spPr>
+        <p:style>
+          <a:lnRef idx="2">
+            <a:schemeClr val="accent1">
+              <a:shade val="50000"/>
+            </a:schemeClr>
+          </a:lnRef>
+          <a:fillRef idx="1">
+            <a:schemeClr val="accent1"/>
+          </a:fillRef>
+          <a:effectRef idx="0">
+            <a:schemeClr val="accent1"/>
+          </a:effectRef>
+          <a:fontRef idx="minor">
+            <a:schemeClr val="lt1"/>
+          </a:fontRef>
+        </p:style>
+        <p:txBody>
+          <a:bodyPr rtlCol="0" anchor="ctr"/>
+          <a:lstStyle/>
+          <a:p>
+            <a:pPr algn="ctr"/>
+            <a:endParaRPr lang="en-GB"/>
+          </a:p>
+        </p:txBody>
+      </p:sp>
+      <p:sp>
+        <p:nvSpPr>
+          <p:cNvPr id="39" name="TextBox 38">
+            <a:extLst>
+              <a:ext uri="{FF2B5EF4-FFF2-40B4-BE49-F238E27FC236}">
+                <a16:creationId xmlns:a16="http://schemas.microsoft.com/office/drawing/2014/main" id="{03E306FE-71EE-5B4E-9BA5-8B6A05DB1229}"/>
+              </a:ext>
+            </a:extLst>
+          </p:cNvPr>
+          <p:cNvSpPr txBox="1"/>
+          <p:nvPr/>
+        </p:nvSpPr>
+        <p:spPr>
+          <a:xfrm>
+            <a:off x="881818" y="4049764"/>
+            <a:ext cx="998991" cy="369332"/>
+          </a:xfrm>
+          <a:prstGeom prst="rect">
+            <a:avLst/>
+          </a:prstGeom>
+          <a:noFill/>
+        </p:spPr>
+        <p:txBody>
+          <a:bodyPr wrap="none" rtlCol="0">
+            <a:spAutoFit/>
+          </a:bodyPr>
+          <a:lstStyle/>
+          <a:p>
+            <a:r>
+              <a:rPr lang="en-GB" dirty="0"/>
+              <a:t>Outcome</a:t>
+            </a:r>
+          </a:p>
+        </p:txBody>
+      </p:sp>
+      <p:sp>
+        <p:nvSpPr>
+          <p:cNvPr id="40" name="TextBox 39">
+            <a:extLst>
+              <a:ext uri="{FF2B5EF4-FFF2-40B4-BE49-F238E27FC236}">
+                <a16:creationId xmlns:a16="http://schemas.microsoft.com/office/drawing/2014/main" id="{1834592F-A630-BC43-9101-77A4CC0E7E77}"/>
+              </a:ext>
+            </a:extLst>
+          </p:cNvPr>
+          <p:cNvSpPr txBox="1"/>
+          <p:nvPr/>
+        </p:nvSpPr>
+        <p:spPr>
+          <a:xfrm>
+            <a:off x="675395" y="3221579"/>
+            <a:ext cx="1189749" cy="369332"/>
+          </a:xfrm>
+          <a:prstGeom prst="rect">
+            <a:avLst/>
+          </a:prstGeom>
+          <a:noFill/>
+        </p:spPr>
+        <p:txBody>
+          <a:bodyPr wrap="none" rtlCol="0">
+            <a:spAutoFit/>
+          </a:bodyPr>
+          <a:lstStyle/>
+          <a:p>
+            <a:r>
+              <a:rPr lang="en-GB" dirty="0"/>
+              <a:t>Description</a:t>
+            </a:r>
+          </a:p>
+        </p:txBody>
+      </p:sp>
+      <p:cxnSp>
+        <p:nvCxnSpPr>
+          <p:cNvPr id="41" name="Straight Arrow Connector 40">
+            <a:extLst>
+              <a:ext uri="{FF2B5EF4-FFF2-40B4-BE49-F238E27FC236}">
+                <a16:creationId xmlns:a16="http://schemas.microsoft.com/office/drawing/2014/main" id="{CC6B18BF-69A6-4740-B9F5-36789B72CE43}"/>
+              </a:ext>
+            </a:extLst>
+          </p:cNvPr>
+          <p:cNvCxnSpPr>
+            <a:cxnSpLocks/>
+            <a:stCxn id="2" idx="3"/>
+          </p:cNvCxnSpPr>
+          <p:nvPr/>
+        </p:nvCxnSpPr>
+        <p:spPr>
+          <a:xfrm flipH="1">
+            <a:off x="4855721" y="4341009"/>
+            <a:ext cx="861775" cy="503243"/>
+          </a:xfrm>
+          <a:prstGeom prst="straightConnector1">
+            <a:avLst/>
+          </a:prstGeom>
+          <a:ln>
+            <a:tailEnd type="triangle"/>
+          </a:ln>
+        </p:spPr>
+        <p:style>
+          <a:lnRef idx="1">
+            <a:schemeClr val="accent1"/>
+          </a:lnRef>
+          <a:fillRef idx="0">
+            <a:schemeClr val="accent1"/>
+          </a:fillRef>
+          <a:effectRef idx="0">
+            <a:schemeClr val="accent1"/>
+          </a:effectRef>
+          <a:fontRef idx="minor">
+            <a:schemeClr val="tx1"/>
+          </a:fontRef>
+        </p:style>
+      </p:cxnSp>
+      <p:sp>
+        <p:nvSpPr>
+          <p:cNvPr id="42" name="TextBox 41">
+            <a:extLst>
+              <a:ext uri="{FF2B5EF4-FFF2-40B4-BE49-F238E27FC236}">
+                <a16:creationId xmlns:a16="http://schemas.microsoft.com/office/drawing/2014/main" id="{D2F71333-A13D-E447-B4A8-FC36BA73873F}"/>
+              </a:ext>
+            </a:extLst>
+          </p:cNvPr>
+          <p:cNvSpPr txBox="1"/>
+          <p:nvPr/>
+        </p:nvSpPr>
+        <p:spPr>
+          <a:xfrm>
+            <a:off x="4689069" y="4396936"/>
+            <a:ext cx="718466" cy="369332"/>
+          </a:xfrm>
+          <a:prstGeom prst="rect">
+            <a:avLst/>
+          </a:prstGeom>
+          <a:noFill/>
+        </p:spPr>
+        <p:txBody>
+          <a:bodyPr wrap="none" rtlCol="0">
+            <a:spAutoFit/>
+          </a:bodyPr>
+          <a:lstStyle/>
+          <a:p>
+            <a:r>
+              <a:rPr lang="en-GB" dirty="0"/>
+              <a:t>Has a</a:t>
+            </a:r>
+          </a:p>
+        </p:txBody>
+      </p:sp>
+      <p:sp>
+        <p:nvSpPr>
+          <p:cNvPr id="43" name="Vertical Scroll 42">
+            <a:extLst>
+              <a:ext uri="{FF2B5EF4-FFF2-40B4-BE49-F238E27FC236}">
+                <a16:creationId xmlns:a16="http://schemas.microsoft.com/office/drawing/2014/main" id="{F326B0F2-EFBF-A744-8B8F-E5181652680F}"/>
+              </a:ext>
+            </a:extLst>
+          </p:cNvPr>
+          <p:cNvSpPr/>
+          <p:nvPr/>
+        </p:nvSpPr>
+        <p:spPr>
+          <a:xfrm>
+            <a:off x="4514127" y="4975582"/>
+            <a:ext cx="534175" cy="672864"/>
+          </a:xfrm>
+          <a:prstGeom prst="verticalScroll">
+            <a:avLst/>
+          </a:prstGeom>
+        </p:spPr>
+        <p:style>
+          <a:lnRef idx="2">
+            <a:schemeClr val="accent1">
+              <a:shade val="50000"/>
+            </a:schemeClr>
+          </a:lnRef>
+          <a:fillRef idx="1">
+            <a:schemeClr val="accent1"/>
+          </a:fillRef>
+          <a:effectRef idx="0">
+            <a:schemeClr val="accent1"/>
+          </a:effectRef>
+          <a:fontRef idx="minor">
+            <a:schemeClr val="lt1"/>
+          </a:fontRef>
+        </p:style>
+        <p:txBody>
+          <a:bodyPr rtlCol="0" anchor="ctr"/>
+          <a:lstStyle/>
+          <a:p>
+            <a:pPr algn="ctr"/>
+            <a:endParaRPr lang="en-GB"/>
+          </a:p>
+        </p:txBody>
+      </p:sp>
+      <p:sp>
+        <p:nvSpPr>
+          <p:cNvPr id="44" name="TextBox 43">
+            <a:extLst>
+              <a:ext uri="{FF2B5EF4-FFF2-40B4-BE49-F238E27FC236}">
+                <a16:creationId xmlns:a16="http://schemas.microsoft.com/office/drawing/2014/main" id="{5A61C89F-0C24-1141-91C6-4A1C410FD21C}"/>
+              </a:ext>
+            </a:extLst>
+          </p:cNvPr>
+          <p:cNvSpPr txBox="1"/>
+          <p:nvPr/>
+        </p:nvSpPr>
+        <p:spPr>
+          <a:xfrm>
+            <a:off x="4897266" y="5163083"/>
+            <a:ext cx="782778" cy="369332"/>
+          </a:xfrm>
+          <a:prstGeom prst="rect">
+            <a:avLst/>
+          </a:prstGeom>
+          <a:noFill/>
+        </p:spPr>
+        <p:txBody>
+          <a:bodyPr wrap="none" rtlCol="0">
+            <a:spAutoFit/>
+          </a:bodyPr>
+          <a:lstStyle/>
+          <a:p>
+            <a:r>
+              <a:rPr lang="en-GB" dirty="0"/>
+              <a:t>Profile</a:t>
+            </a:r>
+          </a:p>
+        </p:txBody>
+      </p:sp>
+      <p:cxnSp>
+        <p:nvCxnSpPr>
+          <p:cNvPr id="45" name="Straight Arrow Connector 44">
+            <a:extLst>
+              <a:ext uri="{FF2B5EF4-FFF2-40B4-BE49-F238E27FC236}">
+                <a16:creationId xmlns:a16="http://schemas.microsoft.com/office/drawing/2014/main" id="{B7ED42BB-EFCA-C045-B897-6731138D9E9F}"/>
+              </a:ext>
+            </a:extLst>
+          </p:cNvPr>
+          <p:cNvCxnSpPr>
+            <a:cxnSpLocks/>
+            <a:stCxn id="43" idx="1"/>
+          </p:cNvCxnSpPr>
+          <p:nvPr/>
+        </p:nvCxnSpPr>
+        <p:spPr>
+          <a:xfrm flipH="1" flipV="1">
+            <a:off x="3482111" y="5028707"/>
+            <a:ext cx="1098788" cy="283307"/>
+          </a:xfrm>
+          <a:prstGeom prst="straightConnector1">
+            <a:avLst/>
+          </a:prstGeom>
+          <a:ln>
+            <a:tailEnd type="triangle"/>
+          </a:ln>
+        </p:spPr>
+        <p:style>
+          <a:lnRef idx="1">
+            <a:schemeClr val="accent1"/>
+          </a:lnRef>
+          <a:fillRef idx="0">
+            <a:schemeClr val="accent1"/>
+          </a:fillRef>
+          <a:effectRef idx="0">
+            <a:schemeClr val="accent1"/>
+          </a:effectRef>
+          <a:fontRef idx="minor">
+            <a:schemeClr val="tx1"/>
+          </a:fontRef>
+        </p:style>
+      </p:cxnSp>
+      <p:cxnSp>
+        <p:nvCxnSpPr>
+          <p:cNvPr id="46" name="Straight Arrow Connector 45">
+            <a:extLst>
+              <a:ext uri="{FF2B5EF4-FFF2-40B4-BE49-F238E27FC236}">
+                <a16:creationId xmlns:a16="http://schemas.microsoft.com/office/drawing/2014/main" id="{54B98736-5DCB-C043-ADCC-D753E2662373}"/>
+              </a:ext>
+            </a:extLst>
+          </p:cNvPr>
+          <p:cNvCxnSpPr>
+            <a:cxnSpLocks/>
+          </p:cNvCxnSpPr>
+          <p:nvPr/>
+        </p:nvCxnSpPr>
+        <p:spPr>
+          <a:xfrm flipH="1">
+            <a:off x="3556209" y="5347750"/>
+            <a:ext cx="1019574" cy="237508"/>
+          </a:xfrm>
+          <a:prstGeom prst="straightConnector1">
+            <a:avLst/>
+          </a:prstGeom>
+          <a:ln>
+            <a:tailEnd type="triangle"/>
+          </a:ln>
+        </p:spPr>
+        <p:style>
+          <a:lnRef idx="1">
+            <a:schemeClr val="accent1"/>
+          </a:lnRef>
+          <a:fillRef idx="0">
+            <a:schemeClr val="accent1"/>
+          </a:fillRef>
+          <a:effectRef idx="0">
+            <a:schemeClr val="accent1"/>
+          </a:effectRef>
+          <a:fontRef idx="minor">
+            <a:schemeClr val="tx1"/>
+          </a:fontRef>
+        </p:style>
+      </p:cxnSp>
+      <p:sp>
+        <p:nvSpPr>
+          <p:cNvPr id="47" name="TextBox 46">
+            <a:extLst>
+              <a:ext uri="{FF2B5EF4-FFF2-40B4-BE49-F238E27FC236}">
+                <a16:creationId xmlns:a16="http://schemas.microsoft.com/office/drawing/2014/main" id="{C42CAD8D-A8B2-2B48-AFE3-1A19F8537531}"/>
+              </a:ext>
+            </a:extLst>
+          </p:cNvPr>
+          <p:cNvSpPr txBox="1"/>
+          <p:nvPr/>
+        </p:nvSpPr>
+        <p:spPr>
+          <a:xfrm>
+            <a:off x="2182812" y="4820738"/>
+            <a:ext cx="1403910" cy="369332"/>
+          </a:xfrm>
+          <a:prstGeom prst="rect">
+            <a:avLst/>
+          </a:prstGeom>
+          <a:noFill/>
+        </p:spPr>
+        <p:txBody>
+          <a:bodyPr wrap="none" rtlCol="0">
+            <a:spAutoFit/>
+          </a:bodyPr>
+          <a:lstStyle/>
+          <a:p>
+            <a:r>
+              <a:rPr lang="en-GB" dirty="0"/>
+              <a:t>Demographic</a:t>
+            </a:r>
+          </a:p>
+        </p:txBody>
+      </p:sp>
+      <p:sp>
+        <p:nvSpPr>
+          <p:cNvPr id="48" name="TextBox 47">
+            <a:extLst>
+              <a:ext uri="{FF2B5EF4-FFF2-40B4-BE49-F238E27FC236}">
+                <a16:creationId xmlns:a16="http://schemas.microsoft.com/office/drawing/2014/main" id="{D9CCD9A0-1077-C94B-9AEB-8B588CB03CE3}"/>
+              </a:ext>
+            </a:extLst>
+          </p:cNvPr>
+          <p:cNvSpPr txBox="1"/>
+          <p:nvPr/>
+        </p:nvSpPr>
+        <p:spPr>
+          <a:xfrm>
+            <a:off x="2730601" y="5288169"/>
+            <a:ext cx="997389" cy="646331"/>
+          </a:xfrm>
+          <a:prstGeom prst="rect">
+            <a:avLst/>
+          </a:prstGeom>
+          <a:noFill/>
+        </p:spPr>
+        <p:txBody>
+          <a:bodyPr wrap="none" rtlCol="0">
+            <a:spAutoFit/>
+          </a:bodyPr>
+          <a:lstStyle/>
+          <a:p>
+            <a:r>
+              <a:rPr lang="en-GB" dirty="0"/>
+              <a:t>Medical </a:t>
+            </a:r>
+          </a:p>
+          <a:p>
+            <a:r>
+              <a:rPr lang="en-GB" dirty="0"/>
+              <a:t>condition</a:t>
+            </a:r>
+          </a:p>
+        </p:txBody>
+      </p:sp>
+      <p:sp>
+        <p:nvSpPr>
+          <p:cNvPr id="49" name="Rectangle 48">
+            <a:extLst>
+              <a:ext uri="{FF2B5EF4-FFF2-40B4-BE49-F238E27FC236}">
+                <a16:creationId xmlns:a16="http://schemas.microsoft.com/office/drawing/2014/main" id="{2EAF3915-FA3E-6F47-9571-B4E89A8AC569}"/>
+              </a:ext>
+            </a:extLst>
+          </p:cNvPr>
+          <p:cNvSpPr/>
+          <p:nvPr/>
+        </p:nvSpPr>
+        <p:spPr>
+          <a:xfrm>
+            <a:off x="3002676" y="302151"/>
+            <a:ext cx="5949834" cy="369332"/>
+          </a:xfrm>
+          <a:prstGeom prst="rect">
+            <a:avLst/>
+          </a:prstGeom>
+        </p:spPr>
+        <p:txBody>
+          <a:bodyPr wrap="none">
+            <a:spAutoFit/>
+          </a:bodyPr>
+          <a:lstStyle/>
+          <a:p>
+            <a:r>
+              <a:rPr lang="en-GB" u="sng" dirty="0"/>
+              <a:t>“Are different adverse events reported in different countries?” </a:t>
+            </a:r>
+          </a:p>
+        </p:txBody>
+      </p:sp>
+      <p:cxnSp>
+        <p:nvCxnSpPr>
+          <p:cNvPr id="54" name="Curved Connector 53">
+            <a:extLst>
+              <a:ext uri="{FF2B5EF4-FFF2-40B4-BE49-F238E27FC236}">
+                <a16:creationId xmlns:a16="http://schemas.microsoft.com/office/drawing/2014/main" id="{9FD9A29C-D46F-2948-95B8-6C9DC2FFDA46}"/>
+              </a:ext>
+            </a:extLst>
+          </p:cNvPr>
+          <p:cNvCxnSpPr>
+            <a:stCxn id="4" idx="0"/>
+            <a:endCxn id="20" idx="0"/>
+          </p:cNvCxnSpPr>
+          <p:nvPr/>
+        </p:nvCxnSpPr>
+        <p:spPr>
+          <a:xfrm rot="5400000" flipH="1" flipV="1">
+            <a:off x="5858178" y="-423781"/>
+            <a:ext cx="1769058" cy="5936504"/>
+          </a:xfrm>
+          <a:prstGeom prst="curvedConnector3">
+            <a:avLst>
+              <a:gd name="adj1" fmla="val 143563"/>
+            </a:avLst>
+          </a:prstGeom>
+          <a:ln w="28575">
+            <a:solidFill>
+              <a:schemeClr val="accent3"/>
+            </a:solidFill>
+            <a:headEnd type="triangle"/>
+            <a:tailEnd type="triangle"/>
+          </a:ln>
+        </p:spPr>
+        <p:style>
+          <a:lnRef idx="1">
+            <a:schemeClr val="accent1"/>
+          </a:lnRef>
+          <a:fillRef idx="0">
+            <a:schemeClr val="accent1"/>
+          </a:fillRef>
+          <a:effectRef idx="0">
+            <a:schemeClr val="accent1"/>
+          </a:effectRef>
+          <a:fontRef idx="minor">
+            <a:schemeClr val="tx1"/>
+          </a:fontRef>
+        </p:style>
+      </p:cxnSp>
+      <p:cxnSp>
+        <p:nvCxnSpPr>
+          <p:cNvPr id="57" name="Straight Arrow Connector 56">
+            <a:extLst>
+              <a:ext uri="{FF2B5EF4-FFF2-40B4-BE49-F238E27FC236}">
+                <a16:creationId xmlns:a16="http://schemas.microsoft.com/office/drawing/2014/main" id="{79604397-6C4A-7B4A-8A00-BC2FA987C8A3}"/>
+              </a:ext>
+            </a:extLst>
+          </p:cNvPr>
+          <p:cNvCxnSpPr>
+            <a:cxnSpLocks/>
+            <a:stCxn id="17" idx="2"/>
+            <a:endCxn id="11" idx="0"/>
+          </p:cNvCxnSpPr>
+          <p:nvPr/>
+        </p:nvCxnSpPr>
+        <p:spPr>
+          <a:xfrm>
+            <a:off x="7805708" y="2116158"/>
+            <a:ext cx="24349" cy="2010203"/>
+          </a:xfrm>
+          <a:prstGeom prst="straightConnector1">
+            <a:avLst/>
+          </a:prstGeom>
+          <a:ln>
+            <a:tailEnd type="triangle"/>
+          </a:ln>
+        </p:spPr>
+        <p:style>
+          <a:lnRef idx="1">
+            <a:schemeClr val="accent1"/>
+          </a:lnRef>
+          <a:fillRef idx="0">
+            <a:schemeClr val="accent1"/>
+          </a:fillRef>
+          <a:effectRef idx="0">
+            <a:schemeClr val="accent1"/>
+          </a:effectRef>
+          <a:fontRef idx="minor">
+            <a:schemeClr val="tx1"/>
+          </a:fontRef>
+        </p:style>
+      </p:cxnSp>
+      <p:cxnSp>
+        <p:nvCxnSpPr>
+          <p:cNvPr id="60" name="Straight Arrow Connector 59">
+            <a:extLst>
+              <a:ext uri="{FF2B5EF4-FFF2-40B4-BE49-F238E27FC236}">
+                <a16:creationId xmlns:a16="http://schemas.microsoft.com/office/drawing/2014/main" id="{78E86D4A-AD0E-3645-B854-362A571CA829}"/>
+              </a:ext>
+            </a:extLst>
+          </p:cNvPr>
+          <p:cNvCxnSpPr>
+            <a:cxnSpLocks/>
+          </p:cNvCxnSpPr>
+          <p:nvPr/>
+        </p:nvCxnSpPr>
+        <p:spPr>
+          <a:xfrm flipH="1">
+            <a:off x="6426945" y="2130458"/>
+            <a:ext cx="1322956" cy="1485650"/>
+          </a:xfrm>
+          <a:prstGeom prst="straightConnector1">
+            <a:avLst/>
+          </a:prstGeom>
+          <a:ln>
+            <a:tailEnd type="triangle"/>
+          </a:ln>
+        </p:spPr>
+        <p:style>
+          <a:lnRef idx="1">
+            <a:schemeClr val="accent1"/>
+          </a:lnRef>
+          <a:fillRef idx="0">
+            <a:schemeClr val="accent1"/>
+          </a:fillRef>
+          <a:effectRef idx="0">
+            <a:schemeClr val="accent1"/>
+          </a:effectRef>
+          <a:fontRef idx="minor">
+            <a:schemeClr val="tx1"/>
+          </a:fontRef>
+        </p:style>
+      </p:cxnSp>
+      <p:cxnSp>
+        <p:nvCxnSpPr>
+          <p:cNvPr id="63" name="Straight Arrow Connector 62">
+            <a:extLst>
+              <a:ext uri="{FF2B5EF4-FFF2-40B4-BE49-F238E27FC236}">
+                <a16:creationId xmlns:a16="http://schemas.microsoft.com/office/drawing/2014/main" id="{F5170529-B5F3-D747-9972-ABA1B11F399C}"/>
+              </a:ext>
+            </a:extLst>
+          </p:cNvPr>
+          <p:cNvCxnSpPr>
+            <a:cxnSpLocks/>
+            <a:endCxn id="4" idx="5"/>
+          </p:cNvCxnSpPr>
+          <p:nvPr/>
+        </p:nvCxnSpPr>
+        <p:spPr>
+          <a:xfrm flipH="1">
+            <a:off x="3992701" y="2132307"/>
+            <a:ext cx="3552026" cy="1608945"/>
+          </a:xfrm>
+          <a:prstGeom prst="straightConnector1">
+            <a:avLst/>
+          </a:prstGeom>
+          <a:ln>
+            <a:tailEnd type="triangle"/>
+          </a:ln>
+        </p:spPr>
+        <p:style>
+          <a:lnRef idx="1">
+            <a:schemeClr val="accent1"/>
+          </a:lnRef>
+          <a:fillRef idx="0">
+            <a:schemeClr val="accent1"/>
+          </a:fillRef>
+          <a:effectRef idx="0">
+            <a:schemeClr val="accent1"/>
+          </a:effectRef>
+          <a:fontRef idx="minor">
+            <a:schemeClr val="tx1"/>
+          </a:fontRef>
+        </p:style>
+      </p:cxnSp>
+      <p:sp>
+        <p:nvSpPr>
+          <p:cNvPr id="65" name="TextBox 64">
+            <a:extLst>
+              <a:ext uri="{FF2B5EF4-FFF2-40B4-BE49-F238E27FC236}">
+                <a16:creationId xmlns:a16="http://schemas.microsoft.com/office/drawing/2014/main" id="{7E98732B-4266-E24F-BF86-898284F1A430}"/>
+              </a:ext>
+            </a:extLst>
+          </p:cNvPr>
+          <p:cNvSpPr txBox="1"/>
+          <p:nvPr/>
+        </p:nvSpPr>
+        <p:spPr>
+          <a:xfrm>
+            <a:off x="6937561" y="2175139"/>
+            <a:ext cx="907621" cy="369332"/>
+          </a:xfrm>
+          <a:prstGeom prst="rect">
+            <a:avLst/>
+          </a:prstGeom>
+          <a:noFill/>
+        </p:spPr>
+        <p:txBody>
+          <a:bodyPr wrap="none" rtlCol="0">
+            <a:spAutoFit/>
+          </a:bodyPr>
+          <a:lstStyle/>
+          <a:p>
+            <a:r>
+              <a:rPr lang="en-GB" dirty="0"/>
+              <a:t>contains</a:t>
+            </a:r>
+          </a:p>
+        </p:txBody>
+      </p:sp>
+      <p:sp>
+        <p:nvSpPr>
+          <p:cNvPr id="67" name="TextBox 66">
+            <a:extLst>
+              <a:ext uri="{FF2B5EF4-FFF2-40B4-BE49-F238E27FC236}">
+                <a16:creationId xmlns:a16="http://schemas.microsoft.com/office/drawing/2014/main" id="{767A8D54-CE02-4643-8E2C-AC1241A9A385}"/>
+              </a:ext>
+            </a:extLst>
+          </p:cNvPr>
+          <p:cNvSpPr txBox="1"/>
+          <p:nvPr/>
+        </p:nvSpPr>
+        <p:spPr>
+          <a:xfrm>
+            <a:off x="72787" y="824394"/>
+            <a:ext cx="4067449" cy="2462213"/>
+          </a:xfrm>
+          <a:prstGeom prst="rect">
+            <a:avLst/>
+          </a:prstGeom>
+          <a:solidFill>
+            <a:schemeClr val="bg2">
+              <a:lumMod val="20000"/>
+              <a:lumOff val="80000"/>
+            </a:schemeClr>
+          </a:solidFill>
+        </p:spPr>
+        <p:txBody>
+          <a:bodyPr wrap="square" rtlCol="0">
+            <a:spAutoFit/>
+          </a:bodyPr>
+          <a:lstStyle/>
+          <a:p>
+            <a:pPr marL="342900" indent="-342900">
+              <a:buFont typeface="+mj-lt"/>
+              <a:buAutoNum type="arabicPeriod"/>
+            </a:pPr>
+            <a:r>
+              <a:rPr lang="en-GB" sz="1400" dirty="0">
+                <a:latin typeface="Arial" panose="020B0604020202020204" pitchFamily="34" charset="0"/>
+                <a:cs typeface="Arial" panose="020B0604020202020204" pitchFamily="34" charset="0"/>
+              </a:rPr>
+              <a:t>Generate a list of reactions and countries.</a:t>
+            </a:r>
+          </a:p>
+          <a:p>
+            <a:pPr marL="342900" indent="-342900">
+              <a:buFont typeface="+mj-lt"/>
+              <a:buAutoNum type="arabicPeriod"/>
+            </a:pPr>
+            <a:r>
+              <a:rPr lang="en-GB" sz="1400" dirty="0">
+                <a:latin typeface="Arial" panose="020B0604020202020204" pitchFamily="34" charset="0"/>
+                <a:cs typeface="Arial" panose="020B0604020202020204" pitchFamily="34" charset="0"/>
+              </a:rPr>
+              <a:t>Determine if certain events are only reported in certain countries.</a:t>
+            </a:r>
+          </a:p>
+          <a:p>
+            <a:pPr marL="342900" indent="-342900">
+              <a:buFont typeface="+mj-lt"/>
+              <a:buAutoNum type="arabicPeriod"/>
+            </a:pPr>
+            <a:r>
+              <a:rPr lang="en-GB" sz="1400" dirty="0">
+                <a:latin typeface="Arial" panose="020B0604020202020204" pitchFamily="34" charset="0"/>
+                <a:cs typeface="Arial" panose="020B0604020202020204" pitchFamily="34" charset="0"/>
+              </a:rPr>
+              <a:t>Adverse events are in plain text, develop a method to codify adverse events</a:t>
+            </a:r>
+          </a:p>
+          <a:p>
+            <a:pPr marL="342900" indent="-342900">
+              <a:buFont typeface="+mj-lt"/>
+              <a:buAutoNum type="arabicPeriod"/>
+            </a:pPr>
+            <a:r>
+              <a:rPr lang="en-GB" sz="1400" dirty="0">
+                <a:latin typeface="Arial" panose="020B0604020202020204" pitchFamily="34" charset="0"/>
+                <a:cs typeface="Arial" panose="020B0604020202020204" pitchFamily="34" charset="0"/>
+              </a:rPr>
+              <a:t>Determine the statistical significance of the differences between countries.</a:t>
+            </a:r>
+          </a:p>
+          <a:p>
+            <a:pPr marL="342900" indent="-342900">
+              <a:buFont typeface="+mj-lt"/>
+              <a:buAutoNum type="arabicPeriod"/>
+            </a:pPr>
+            <a:r>
+              <a:rPr lang="en-GB" sz="1400" dirty="0">
+                <a:latin typeface="Arial" panose="020B0604020202020204" pitchFamily="34" charset="0"/>
+                <a:cs typeface="Arial" panose="020B0604020202020204" pitchFamily="34" charset="0"/>
+              </a:rPr>
+              <a:t>Expand to a larger sample of data, to determine if this is consistent across time. If possible try to account for prevalence of illness and use of medicines per country. </a:t>
+            </a:r>
+          </a:p>
+        </p:txBody>
+      </p:sp>
     </p:spTree>
     <p:extLst>
       <p:ext uri="{BB962C8B-B14F-4D97-AF65-F5344CB8AC3E}">

</xml_diff>